<commit_message>
Upload new notebook & slides
</commit_message>
<xml_diff>
--- a/LinearRegression_slides.pptx
+++ b/LinearRegression_slides.pptx
@@ -4,8 +4,18 @@
   <p:sldMasterIdLst>
     <p:sldMasterId id="2147483648" r:id="rId1"/>
   </p:sldMasterIdLst>
+  <p:notesMasterIdLst>
+    <p:notesMasterId r:id="rId10"/>
+  </p:notesMasterIdLst>
   <p:sldIdLst>
     <p:sldId id="256" r:id="rId2"/>
+    <p:sldId id="257" r:id="rId3"/>
+    <p:sldId id="258" r:id="rId4"/>
+    <p:sldId id="259" r:id="rId5"/>
+    <p:sldId id="260" r:id="rId6"/>
+    <p:sldId id="261" r:id="rId7"/>
+    <p:sldId id="262" r:id="rId8"/>
+    <p:sldId id="263" r:id="rId9"/>
   </p:sldIdLst>
   <p:sldSz cx="12192000" cy="6858000"/>
   <p:notesSz cx="6858000" cy="9144000"/>
@@ -104,11 +114,365 @@
       </a:defRPr>
     </a:lvl9pPr>
   </p:defaultTextStyle>
+  <p:extLst>
+    <p:ext uri="{EFAFB233-063F-42B5-8137-9DF3F51BA10A}">
+      <p15:sldGuideLst xmlns:p15="http://schemas.microsoft.com/office/powerpoint/2012/main"/>
+    </p:ext>
+  </p:extLst>
 </p:presentation>
 </file>
 
+<file path=ppt/notesMasters/notesMaster1.xml><?xml version="1.0" encoding="utf-8"?>
+<p:notesMaster xmlns:a="http://schemas.openxmlformats.org/drawingml/2006/main" xmlns:r="http://schemas.openxmlformats.org/officeDocument/2006/relationships" xmlns:p="http://schemas.openxmlformats.org/presentationml/2006/main">
+  <p:cSld>
+    <p:bg>
+      <p:bgRef idx="1001">
+        <a:schemeClr val="bg1"/>
+      </p:bgRef>
+    </p:bg>
+    <p:spTree>
+      <p:nvGrpSpPr>
+        <p:cNvPr id="1" name=""/>
+        <p:cNvGrpSpPr/>
+        <p:nvPr/>
+      </p:nvGrpSpPr>
+      <p:grpSpPr>
+        <a:xfrm>
+          <a:off x="0" y="0"/>
+          <a:ext cx="0" cy="0"/>
+          <a:chOff x="0" y="0"/>
+          <a:chExt cx="0" cy="0"/>
+        </a:xfrm>
+      </p:grpSpPr>
+      <p:sp>
+        <p:nvSpPr>
+          <p:cNvPr id="2" name="Header Placeholder 1"/>
+          <p:cNvSpPr>
+            <a:spLocks noGrp="1"/>
+          </p:cNvSpPr>
+          <p:nvPr>
+            <p:ph type="hdr" sz="quarter"/>
+          </p:nvPr>
+        </p:nvSpPr>
+        <p:spPr>
+          <a:xfrm>
+            <a:off x="0" y="0"/>
+            <a:ext cx="2971800" cy="458788"/>
+          </a:xfrm>
+          <a:prstGeom prst="rect">
+            <a:avLst/>
+          </a:prstGeom>
+        </p:spPr>
+        <p:txBody>
+          <a:bodyPr vert="horz" lIns="91440" tIns="45720" rIns="91440" bIns="45720" rtlCol="0"/>
+          <a:lstStyle>
+            <a:lvl1pPr algn="l">
+              <a:defRPr sz="1200"/>
+            </a:lvl1pPr>
+          </a:lstStyle>
+          <a:p>
+            <a:endParaRPr lang="en-GB"/>
+          </a:p>
+        </p:txBody>
+      </p:sp>
+      <p:sp>
+        <p:nvSpPr>
+          <p:cNvPr id="3" name="Date Placeholder 2"/>
+          <p:cNvSpPr>
+            <a:spLocks noGrp="1"/>
+          </p:cNvSpPr>
+          <p:nvPr>
+            <p:ph type="dt" idx="1"/>
+          </p:nvPr>
+        </p:nvSpPr>
+        <p:spPr>
+          <a:xfrm>
+            <a:off x="3884613" y="0"/>
+            <a:ext cx="2971800" cy="458788"/>
+          </a:xfrm>
+          <a:prstGeom prst="rect">
+            <a:avLst/>
+          </a:prstGeom>
+        </p:spPr>
+        <p:txBody>
+          <a:bodyPr vert="horz" lIns="91440" tIns="45720" rIns="91440" bIns="45720" rtlCol="0"/>
+          <a:lstStyle>
+            <a:lvl1pPr algn="r">
+              <a:defRPr sz="1200"/>
+            </a:lvl1pPr>
+          </a:lstStyle>
+          <a:p>
+            <a:fld id="{A26A842C-5E70-4BAE-8BD8-743E74B93015}" type="datetimeFigureOut">
+              <a:rPr lang="en-GB" smtClean="0"/>
+              <a:t>24/01/2025</a:t>
+            </a:fld>
+            <a:endParaRPr lang="en-GB"/>
+          </a:p>
+        </p:txBody>
+      </p:sp>
+      <p:sp>
+        <p:nvSpPr>
+          <p:cNvPr id="4" name="Slide Image Placeholder 3"/>
+          <p:cNvSpPr>
+            <a:spLocks noGrp="1" noRot="1" noChangeAspect="1"/>
+          </p:cNvSpPr>
+          <p:nvPr>
+            <p:ph type="sldImg" idx="2"/>
+          </p:nvPr>
+        </p:nvSpPr>
+        <p:spPr>
+          <a:xfrm>
+            <a:off x="685800" y="1143000"/>
+            <a:ext cx="5486400" cy="3086100"/>
+          </a:xfrm>
+          <a:prstGeom prst="rect">
+            <a:avLst/>
+          </a:prstGeom>
+          <a:noFill/>
+          <a:ln w="12700">
+            <a:solidFill>
+              <a:prstClr val="black"/>
+            </a:solidFill>
+          </a:ln>
+        </p:spPr>
+        <p:txBody>
+          <a:bodyPr vert="horz" lIns="91440" tIns="45720" rIns="91440" bIns="45720" rtlCol="0" anchor="ctr"/>
+          <a:lstStyle/>
+          <a:p>
+            <a:endParaRPr lang="en-GB"/>
+          </a:p>
+        </p:txBody>
+      </p:sp>
+      <p:sp>
+        <p:nvSpPr>
+          <p:cNvPr id="5" name="Notes Placeholder 4"/>
+          <p:cNvSpPr>
+            <a:spLocks noGrp="1"/>
+          </p:cNvSpPr>
+          <p:nvPr>
+            <p:ph type="body" sz="quarter" idx="3"/>
+          </p:nvPr>
+        </p:nvSpPr>
+        <p:spPr>
+          <a:xfrm>
+            <a:off x="685800" y="4400550"/>
+            <a:ext cx="5486400" cy="3600450"/>
+          </a:xfrm>
+          <a:prstGeom prst="rect">
+            <a:avLst/>
+          </a:prstGeom>
+        </p:spPr>
+        <p:txBody>
+          <a:bodyPr vert="horz" lIns="91440" tIns="45720" rIns="91440" bIns="45720" rtlCol="0"/>
+          <a:lstStyle/>
+          <a:p>
+            <a:pPr lvl="0"/>
+            <a:r>
+              <a:rPr lang="en-GB"/>
+              <a:t>Click to edit Master text styles</a:t>
+            </a:r>
+          </a:p>
+          <a:p>
+            <a:pPr lvl="1"/>
+            <a:r>
+              <a:rPr lang="en-GB"/>
+              <a:t>Second level</a:t>
+            </a:r>
+          </a:p>
+          <a:p>
+            <a:pPr lvl="2"/>
+            <a:r>
+              <a:rPr lang="en-GB"/>
+              <a:t>Third level</a:t>
+            </a:r>
+          </a:p>
+          <a:p>
+            <a:pPr lvl="3"/>
+            <a:r>
+              <a:rPr lang="en-GB"/>
+              <a:t>Fourth level</a:t>
+            </a:r>
+          </a:p>
+          <a:p>
+            <a:pPr lvl="4"/>
+            <a:r>
+              <a:rPr lang="en-GB"/>
+              <a:t>Fifth level</a:t>
+            </a:r>
+          </a:p>
+        </p:txBody>
+      </p:sp>
+      <p:sp>
+        <p:nvSpPr>
+          <p:cNvPr id="6" name="Footer Placeholder 5"/>
+          <p:cNvSpPr>
+            <a:spLocks noGrp="1"/>
+          </p:cNvSpPr>
+          <p:nvPr>
+            <p:ph type="ftr" sz="quarter" idx="4"/>
+          </p:nvPr>
+        </p:nvSpPr>
+        <p:spPr>
+          <a:xfrm>
+            <a:off x="0" y="8685213"/>
+            <a:ext cx="2971800" cy="458787"/>
+          </a:xfrm>
+          <a:prstGeom prst="rect">
+            <a:avLst/>
+          </a:prstGeom>
+        </p:spPr>
+        <p:txBody>
+          <a:bodyPr vert="horz" lIns="91440" tIns="45720" rIns="91440" bIns="45720" rtlCol="0" anchor="b"/>
+          <a:lstStyle>
+            <a:lvl1pPr algn="l">
+              <a:defRPr sz="1200"/>
+            </a:lvl1pPr>
+          </a:lstStyle>
+          <a:p>
+            <a:endParaRPr lang="en-GB"/>
+          </a:p>
+        </p:txBody>
+      </p:sp>
+      <p:sp>
+        <p:nvSpPr>
+          <p:cNvPr id="7" name="Slide Number Placeholder 6"/>
+          <p:cNvSpPr>
+            <a:spLocks noGrp="1"/>
+          </p:cNvSpPr>
+          <p:nvPr>
+            <p:ph type="sldNum" sz="quarter" idx="5"/>
+          </p:nvPr>
+        </p:nvSpPr>
+        <p:spPr>
+          <a:xfrm>
+            <a:off x="3884613" y="8685213"/>
+            <a:ext cx="2971800" cy="458787"/>
+          </a:xfrm>
+          <a:prstGeom prst="rect">
+            <a:avLst/>
+          </a:prstGeom>
+        </p:spPr>
+        <p:txBody>
+          <a:bodyPr vert="horz" lIns="91440" tIns="45720" rIns="91440" bIns="45720" rtlCol="0" anchor="b"/>
+          <a:lstStyle>
+            <a:lvl1pPr algn="r">
+              <a:defRPr sz="1200"/>
+            </a:lvl1pPr>
+          </a:lstStyle>
+          <a:p>
+            <a:fld id="{B471D0F1-4ECD-4259-9007-25DA2FF52237}" type="slidenum">
+              <a:rPr lang="en-GB" smtClean="0"/>
+              <a:t>‹#›</a:t>
+            </a:fld>
+            <a:endParaRPr lang="en-GB"/>
+          </a:p>
+        </p:txBody>
+      </p:sp>
+    </p:spTree>
+    <p:extLst>
+      <p:ext uri="{BB962C8B-B14F-4D97-AF65-F5344CB8AC3E}">
+        <p14:creationId xmlns:p14="http://schemas.microsoft.com/office/powerpoint/2010/main" val="638642448"/>
+      </p:ext>
+    </p:extLst>
+  </p:cSld>
+  <p:clrMap bg1="lt1" tx1="dk1" bg2="lt2" tx2="dk2" accent1="accent1" accent2="accent2" accent3="accent3" accent4="accent4" accent5="accent5" accent6="accent6" hlink="hlink" folHlink="folHlink"/>
+  <p:notesStyle>
+    <a:lvl1pPr marL="0" algn="l" defTabSz="914400" rtl="0" eaLnBrk="1" latinLnBrk="0" hangingPunct="1">
+      <a:defRPr sz="1200" kern="1200">
+        <a:solidFill>
+          <a:schemeClr val="tx1"/>
+        </a:solidFill>
+        <a:latin typeface="+mn-lt"/>
+        <a:ea typeface="+mn-ea"/>
+        <a:cs typeface="+mn-cs"/>
+      </a:defRPr>
+    </a:lvl1pPr>
+    <a:lvl2pPr marL="457200" algn="l" defTabSz="914400" rtl="0" eaLnBrk="1" latinLnBrk="0" hangingPunct="1">
+      <a:defRPr sz="1200" kern="1200">
+        <a:solidFill>
+          <a:schemeClr val="tx1"/>
+        </a:solidFill>
+        <a:latin typeface="+mn-lt"/>
+        <a:ea typeface="+mn-ea"/>
+        <a:cs typeface="+mn-cs"/>
+      </a:defRPr>
+    </a:lvl2pPr>
+    <a:lvl3pPr marL="914400" algn="l" defTabSz="914400" rtl="0" eaLnBrk="1" latinLnBrk="0" hangingPunct="1">
+      <a:defRPr sz="1200" kern="1200">
+        <a:solidFill>
+          <a:schemeClr val="tx1"/>
+        </a:solidFill>
+        <a:latin typeface="+mn-lt"/>
+        <a:ea typeface="+mn-ea"/>
+        <a:cs typeface="+mn-cs"/>
+      </a:defRPr>
+    </a:lvl3pPr>
+    <a:lvl4pPr marL="1371600" algn="l" defTabSz="914400" rtl="0" eaLnBrk="1" latinLnBrk="0" hangingPunct="1">
+      <a:defRPr sz="1200" kern="1200">
+        <a:solidFill>
+          <a:schemeClr val="tx1"/>
+        </a:solidFill>
+        <a:latin typeface="+mn-lt"/>
+        <a:ea typeface="+mn-ea"/>
+        <a:cs typeface="+mn-cs"/>
+      </a:defRPr>
+    </a:lvl4pPr>
+    <a:lvl5pPr marL="1828800" algn="l" defTabSz="914400" rtl="0" eaLnBrk="1" latinLnBrk="0" hangingPunct="1">
+      <a:defRPr sz="1200" kern="1200">
+        <a:solidFill>
+          <a:schemeClr val="tx1"/>
+        </a:solidFill>
+        <a:latin typeface="+mn-lt"/>
+        <a:ea typeface="+mn-ea"/>
+        <a:cs typeface="+mn-cs"/>
+      </a:defRPr>
+    </a:lvl5pPr>
+    <a:lvl6pPr marL="2286000" algn="l" defTabSz="914400" rtl="0" eaLnBrk="1" latinLnBrk="0" hangingPunct="1">
+      <a:defRPr sz="1200" kern="1200">
+        <a:solidFill>
+          <a:schemeClr val="tx1"/>
+        </a:solidFill>
+        <a:latin typeface="+mn-lt"/>
+        <a:ea typeface="+mn-ea"/>
+        <a:cs typeface="+mn-cs"/>
+      </a:defRPr>
+    </a:lvl6pPr>
+    <a:lvl7pPr marL="2743200" algn="l" defTabSz="914400" rtl="0" eaLnBrk="1" latinLnBrk="0" hangingPunct="1">
+      <a:defRPr sz="1200" kern="1200">
+        <a:solidFill>
+          <a:schemeClr val="tx1"/>
+        </a:solidFill>
+        <a:latin typeface="+mn-lt"/>
+        <a:ea typeface="+mn-ea"/>
+        <a:cs typeface="+mn-cs"/>
+      </a:defRPr>
+    </a:lvl7pPr>
+    <a:lvl8pPr marL="3200400" algn="l" defTabSz="914400" rtl="0" eaLnBrk="1" latinLnBrk="0" hangingPunct="1">
+      <a:defRPr sz="1200" kern="1200">
+        <a:solidFill>
+          <a:schemeClr val="tx1"/>
+        </a:solidFill>
+        <a:latin typeface="+mn-lt"/>
+        <a:ea typeface="+mn-ea"/>
+        <a:cs typeface="+mn-cs"/>
+      </a:defRPr>
+    </a:lvl8pPr>
+    <a:lvl9pPr marL="3657600" algn="l" defTabSz="914400" rtl="0" eaLnBrk="1" latinLnBrk="0" hangingPunct="1">
+      <a:defRPr sz="1200" kern="1200">
+        <a:solidFill>
+          <a:schemeClr val="tx1"/>
+        </a:solidFill>
+        <a:latin typeface="+mn-lt"/>
+        <a:ea typeface="+mn-ea"/>
+        <a:cs typeface="+mn-cs"/>
+      </a:defRPr>
+    </a:lvl9pPr>
+  </p:notesStyle>
+</p:notesMaster>
+</file>
+
 <file path=ppt/slideLayouts/slideLayout1.xml><?xml version="1.0" encoding="utf-8"?>
-<p:sldLayout xmlns:a="http://schemas.openxmlformats.org/drawingml/2006/main" xmlns:r="http://schemas.openxmlformats.org/officeDocument/2006/relationships" xmlns:p="http://schemas.openxmlformats.org/presentationml/2006/main" type="title" preserve="1">
+<p:sldLayout xmlns:a="http://schemas.openxmlformats.org/drawingml/2006/main" xmlns:r="http://schemas.openxmlformats.org/officeDocument/2006/relationships" xmlns:p="http://schemas.openxmlformats.org/presentationml/2006/main" preserve="1" userDrawn="1">
   <p:cSld name="Title Slide">
     <p:spTree>
       <p:nvGrpSpPr>
@@ -126,190 +490,104 @@
       </p:grpSpPr>
       <p:sp>
         <p:nvSpPr>
-          <p:cNvPr id="2" name="Title 1">
-            <a:extLst>
-              <a:ext uri="{FF2B5EF4-FFF2-40B4-BE49-F238E27FC236}">
-                <a16:creationId xmlns:a16="http://schemas.microsoft.com/office/drawing/2014/main" id="{DBE51DFE-FA66-9BFF-4E4D-CC85E3E2E314}"/>
-              </a:ext>
-            </a:extLst>
-          </p:cNvPr>
-          <p:cNvSpPr>
-            <a:spLocks noGrp="1"/>
-          </p:cNvSpPr>
-          <p:nvPr>
-            <p:ph type="ctrTitle"/>
-          </p:nvPr>
-        </p:nvSpPr>
-        <p:spPr>
-          <a:xfrm>
-            <a:off x="1524000" y="1122363"/>
-            <a:ext cx="9144000" cy="2387600"/>
-          </a:xfrm>
-        </p:spPr>
-        <p:txBody>
-          <a:bodyPr anchor="b"/>
-          <a:lstStyle>
-            <a:lvl1pPr algn="ctr">
-              <a:defRPr sz="6000"/>
-            </a:lvl1pPr>
-          </a:lstStyle>
-          <a:p>
-            <a:r>
-              <a:rPr lang="en-GB"/>
-              <a:t>Click to edit Master title style</a:t>
-            </a:r>
-          </a:p>
-        </p:txBody>
-      </p:sp>
-      <p:sp>
-        <p:nvSpPr>
-          <p:cNvPr id="3" name="Subtitle 2">
-            <a:extLst>
-              <a:ext uri="{FF2B5EF4-FFF2-40B4-BE49-F238E27FC236}">
-                <a16:creationId xmlns:a16="http://schemas.microsoft.com/office/drawing/2014/main" id="{0A847239-62CC-D5E9-EC75-0F43EAA2D9AC}"/>
-              </a:ext>
-            </a:extLst>
-          </p:cNvPr>
-          <p:cNvSpPr>
-            <a:spLocks noGrp="1"/>
-          </p:cNvSpPr>
-          <p:nvPr>
-            <p:ph type="subTitle" idx="1"/>
-          </p:nvPr>
-        </p:nvSpPr>
-        <p:spPr>
-          <a:xfrm>
-            <a:off x="1524000" y="3602038"/>
-            <a:ext cx="9144000" cy="1655762"/>
-          </a:xfrm>
-        </p:spPr>
-        <p:txBody>
-          <a:bodyPr/>
-          <a:lstStyle>
-            <a:lvl1pPr marL="0" indent="0" algn="ctr">
-              <a:buNone/>
-              <a:defRPr sz="2400"/>
-            </a:lvl1pPr>
-            <a:lvl2pPr marL="457200" indent="0" algn="ctr">
-              <a:buNone/>
-              <a:defRPr sz="2000"/>
-            </a:lvl2pPr>
-            <a:lvl3pPr marL="914400" indent="0" algn="ctr">
-              <a:buNone/>
-              <a:defRPr sz="1800"/>
-            </a:lvl3pPr>
-            <a:lvl4pPr marL="1371600" indent="0" algn="ctr">
-              <a:buNone/>
-              <a:defRPr sz="1600"/>
-            </a:lvl4pPr>
-            <a:lvl5pPr marL="1828800" indent="0" algn="ctr">
-              <a:buNone/>
-              <a:defRPr sz="1600"/>
-            </a:lvl5pPr>
-            <a:lvl6pPr marL="2286000" indent="0" algn="ctr">
-              <a:buNone/>
-              <a:defRPr sz="1600"/>
-            </a:lvl6pPr>
-            <a:lvl7pPr marL="2743200" indent="0" algn="ctr">
-              <a:buNone/>
-              <a:defRPr sz="1600"/>
-            </a:lvl7pPr>
-            <a:lvl8pPr marL="3200400" indent="0" algn="ctr">
-              <a:buNone/>
-              <a:defRPr sz="1600"/>
-            </a:lvl8pPr>
-            <a:lvl9pPr marL="3657600" indent="0" algn="ctr">
-              <a:buNone/>
-              <a:defRPr sz="1600"/>
-            </a:lvl9pPr>
-          </a:lstStyle>
-          <a:p>
-            <a:r>
-              <a:rPr lang="en-GB"/>
-              <a:t>Click to edit Master subtitle style</a:t>
-            </a:r>
-          </a:p>
-        </p:txBody>
-      </p:sp>
-      <p:sp>
-        <p:nvSpPr>
-          <p:cNvPr id="4" name="Date Placeholder 3">
-            <a:extLst>
-              <a:ext uri="{FF2B5EF4-FFF2-40B4-BE49-F238E27FC236}">
-                <a16:creationId xmlns:a16="http://schemas.microsoft.com/office/drawing/2014/main" id="{0A261201-B5B2-3F5F-05D4-F04E60F3A792}"/>
-              </a:ext>
-            </a:extLst>
-          </p:cNvPr>
-          <p:cNvSpPr>
-            <a:spLocks noGrp="1"/>
-          </p:cNvSpPr>
-          <p:nvPr>
-            <p:ph type="dt" sz="half" idx="10"/>
-          </p:nvPr>
-        </p:nvSpPr>
-        <p:spPr/>
-        <p:txBody>
-          <a:bodyPr/>
+          <p:cNvPr id="7" name="Rectangle 6">
+            <a:extLst>
+              <a:ext uri="{FF2B5EF4-FFF2-40B4-BE49-F238E27FC236}">
+                <a16:creationId xmlns:a16="http://schemas.microsoft.com/office/drawing/2014/main" id="{42A06413-F1CB-CE0C-5444-13A53AA13163}"/>
+              </a:ext>
+            </a:extLst>
+          </p:cNvPr>
+          <p:cNvSpPr/>
+          <p:nvPr userDrawn="1"/>
+        </p:nvSpPr>
+        <p:spPr>
+          <a:xfrm>
+            <a:off x="-106532" y="6356350"/>
+            <a:ext cx="12446493" cy="501650"/>
+          </a:xfrm>
+          <a:prstGeom prst="rect">
+            <a:avLst/>
+          </a:prstGeom>
+          <a:solidFill>
+            <a:srgbClr val="2F3A4C"/>
+          </a:solidFill>
+          <a:ln>
+            <a:noFill/>
+          </a:ln>
+        </p:spPr>
+        <p:style>
+          <a:lnRef idx="2">
+            <a:schemeClr val="accent1">
+              <a:shade val="15000"/>
+            </a:schemeClr>
+          </a:lnRef>
+          <a:fillRef idx="1">
+            <a:schemeClr val="accent1"/>
+          </a:fillRef>
+          <a:effectRef idx="0">
+            <a:schemeClr val="accent1"/>
+          </a:effectRef>
+          <a:fontRef idx="minor">
+            <a:schemeClr val="lt1"/>
+          </a:fontRef>
+        </p:style>
+        <p:txBody>
+          <a:bodyPr rtlCol="0" anchor="ctr"/>
           <a:lstStyle/>
           <a:p>
-            <a:fld id="{A54CE22A-A271-4833-999D-90A3D050652D}" type="datetimeFigureOut">
-              <a:rPr lang="en-GB" smtClean="0"/>
-              <a:t>22/01/2025</a:t>
-            </a:fld>
+            <a:pPr algn="ctr"/>
             <a:endParaRPr lang="en-GB"/>
           </a:p>
         </p:txBody>
       </p:sp>
       <p:sp>
         <p:nvSpPr>
-          <p:cNvPr id="5" name="Footer Placeholder 4">
-            <a:extLst>
-              <a:ext uri="{FF2B5EF4-FFF2-40B4-BE49-F238E27FC236}">
-                <a16:creationId xmlns:a16="http://schemas.microsoft.com/office/drawing/2014/main" id="{07DDA25C-2CB7-2624-158A-3FD56D550689}"/>
-              </a:ext>
-            </a:extLst>
-          </p:cNvPr>
-          <p:cNvSpPr>
-            <a:spLocks noGrp="1"/>
-          </p:cNvSpPr>
-          <p:nvPr>
-            <p:ph type="ftr" sz="quarter" idx="11"/>
-          </p:nvPr>
-        </p:nvSpPr>
-        <p:spPr/>
-        <p:txBody>
-          <a:bodyPr/>
+          <p:cNvPr id="9" name="Rectangle 8">
+            <a:extLst>
+              <a:ext uri="{FF2B5EF4-FFF2-40B4-BE49-F238E27FC236}">
+                <a16:creationId xmlns:a16="http://schemas.microsoft.com/office/drawing/2014/main" id="{55541ADB-BE55-19E1-5846-836A0F634A56}"/>
+              </a:ext>
+            </a:extLst>
+          </p:cNvPr>
+          <p:cNvSpPr/>
+          <p:nvPr userDrawn="1"/>
+        </p:nvSpPr>
+        <p:spPr>
+          <a:xfrm>
+            <a:off x="594803" y="2550110"/>
+            <a:ext cx="5589973" cy="1757779"/>
+          </a:xfrm>
+          <a:prstGeom prst="rect">
+            <a:avLst/>
+          </a:prstGeom>
+          <a:solidFill>
+            <a:srgbClr val="3C7D3D"/>
+          </a:solidFill>
+          <a:ln>
+            <a:noFill/>
+          </a:ln>
+        </p:spPr>
+        <p:style>
+          <a:lnRef idx="2">
+            <a:schemeClr val="accent1">
+              <a:shade val="15000"/>
+            </a:schemeClr>
+          </a:lnRef>
+          <a:fillRef idx="1">
+            <a:schemeClr val="accent1"/>
+          </a:fillRef>
+          <a:effectRef idx="0">
+            <a:schemeClr val="accent1"/>
+          </a:effectRef>
+          <a:fontRef idx="minor">
+            <a:schemeClr val="lt1"/>
+          </a:fontRef>
+        </p:style>
+        <p:txBody>
+          <a:bodyPr rtlCol="0" anchor="ctr"/>
           <a:lstStyle/>
           <a:p>
-            <a:endParaRPr lang="en-GB"/>
-          </a:p>
-        </p:txBody>
-      </p:sp>
-      <p:sp>
-        <p:nvSpPr>
-          <p:cNvPr id="6" name="Slide Number Placeholder 5">
-            <a:extLst>
-              <a:ext uri="{FF2B5EF4-FFF2-40B4-BE49-F238E27FC236}">
-                <a16:creationId xmlns:a16="http://schemas.microsoft.com/office/drawing/2014/main" id="{9498BA7F-F102-7630-AD0A-57BA1C9D14F3}"/>
-              </a:ext>
-            </a:extLst>
-          </p:cNvPr>
-          <p:cNvSpPr>
-            <a:spLocks noGrp="1"/>
-          </p:cNvSpPr>
-          <p:nvPr>
-            <p:ph type="sldNum" sz="quarter" idx="12"/>
-          </p:nvPr>
-        </p:nvSpPr>
-        <p:spPr/>
-        <p:txBody>
-          <a:bodyPr/>
-          <a:lstStyle/>
-          <a:p>
-            <a:fld id="{9C776F3C-6170-4CFA-981E-E57EE68DA2DA}" type="slidenum">
-              <a:rPr lang="en-GB" smtClean="0"/>
-              <a:t>‹#›</a:t>
-            </a:fld>
+            <a:pPr algn="ctr"/>
             <a:endParaRPr lang="en-GB"/>
           </a:p>
         </p:txBody>
@@ -452,7 +730,7 @@
           <a:p>
             <a:fld id="{A54CE22A-A271-4833-999D-90A3D050652D}" type="datetimeFigureOut">
               <a:rPr lang="en-GB" smtClean="0"/>
-              <a:t>22/01/2025</a:t>
+              <a:t>24/01/2025</a:t>
             </a:fld>
             <a:endParaRPr lang="en-GB"/>
           </a:p>
@@ -660,7 +938,7 @@
           <a:p>
             <a:fld id="{A54CE22A-A271-4833-999D-90A3D050652D}" type="datetimeFigureOut">
               <a:rPr lang="en-GB" smtClean="0"/>
-              <a:t>22/01/2025</a:t>
+              <a:t>24/01/2025</a:t>
             </a:fld>
             <a:endParaRPr lang="en-GB"/>
           </a:p>
@@ -858,7 +1136,7 @@
           <a:p>
             <a:fld id="{A54CE22A-A271-4833-999D-90A3D050652D}" type="datetimeFigureOut">
               <a:rPr lang="en-GB" smtClean="0"/>
-              <a:t>22/01/2025</a:t>
+              <a:t>24/01/2025</a:t>
             </a:fld>
             <a:endParaRPr lang="en-GB"/>
           </a:p>
@@ -1133,7 +1411,7 @@
           <a:p>
             <a:fld id="{A54CE22A-A271-4833-999D-90A3D050652D}" type="datetimeFigureOut">
               <a:rPr lang="en-GB" smtClean="0"/>
-              <a:t>22/01/2025</a:t>
+              <a:t>24/01/2025</a:t>
             </a:fld>
             <a:endParaRPr lang="en-GB"/>
           </a:p>
@@ -1398,7 +1676,7 @@
           <a:p>
             <a:fld id="{A54CE22A-A271-4833-999D-90A3D050652D}" type="datetimeFigureOut">
               <a:rPr lang="en-GB" smtClean="0"/>
-              <a:t>22/01/2025</a:t>
+              <a:t>24/01/2025</a:t>
             </a:fld>
             <a:endParaRPr lang="en-GB"/>
           </a:p>
@@ -1810,7 +2088,7 @@
           <a:p>
             <a:fld id="{A54CE22A-A271-4833-999D-90A3D050652D}" type="datetimeFigureOut">
               <a:rPr lang="en-GB" smtClean="0"/>
-              <a:t>22/01/2025</a:t>
+              <a:t>24/01/2025</a:t>
             </a:fld>
             <a:endParaRPr lang="en-GB"/>
           </a:p>
@@ -1951,7 +2229,7 @@
           <a:p>
             <a:fld id="{A54CE22A-A271-4833-999D-90A3D050652D}" type="datetimeFigureOut">
               <a:rPr lang="en-GB" smtClean="0"/>
-              <a:t>22/01/2025</a:t>
+              <a:t>24/01/2025</a:t>
             </a:fld>
             <a:endParaRPr lang="en-GB"/>
           </a:p>
@@ -2025,7 +2303,7 @@
 </file>
 
 <file path=ppt/slideLayouts/slideLayout7.xml><?xml version="1.0" encoding="utf-8"?>
-<p:sldLayout xmlns:a="http://schemas.openxmlformats.org/drawingml/2006/main" xmlns:r="http://schemas.openxmlformats.org/officeDocument/2006/relationships" xmlns:p="http://schemas.openxmlformats.org/presentationml/2006/main" type="blank" preserve="1">
+<p:sldLayout xmlns:a="http://schemas.openxmlformats.org/drawingml/2006/main" xmlns:r="http://schemas.openxmlformats.org/officeDocument/2006/relationships" xmlns:p="http://schemas.openxmlformats.org/presentationml/2006/main" preserve="1" userDrawn="1">
   <p:cSld name="Blank">
     <p:spTree>
       <p:nvGrpSpPr>
@@ -2043,10 +2321,232 @@
       </p:grpSpPr>
       <p:sp>
         <p:nvSpPr>
-          <p:cNvPr id="2" name="Date Placeholder 1">
-            <a:extLst>
-              <a:ext uri="{FF2B5EF4-FFF2-40B4-BE49-F238E27FC236}">
-                <a16:creationId xmlns:a16="http://schemas.microsoft.com/office/drawing/2014/main" id="{AF3C27B3-3507-BF88-6F64-89A618942E96}"/>
+          <p:cNvPr id="5" name="Rectangle 4">
+            <a:extLst>
+              <a:ext uri="{FF2B5EF4-FFF2-40B4-BE49-F238E27FC236}">
+                <a16:creationId xmlns:a16="http://schemas.microsoft.com/office/drawing/2014/main" id="{AE884A4F-92D0-BCF6-7F8C-B9DA10BEBC67}"/>
+              </a:ext>
+            </a:extLst>
+          </p:cNvPr>
+          <p:cNvSpPr/>
+          <p:nvPr userDrawn="1"/>
+        </p:nvSpPr>
+        <p:spPr>
+          <a:xfrm>
+            <a:off x="-106532" y="6356350"/>
+            <a:ext cx="12446493" cy="501650"/>
+          </a:xfrm>
+          <a:prstGeom prst="rect">
+            <a:avLst/>
+          </a:prstGeom>
+          <a:solidFill>
+            <a:srgbClr val="2F3A4C"/>
+          </a:solidFill>
+          <a:ln>
+            <a:noFill/>
+          </a:ln>
+        </p:spPr>
+        <p:style>
+          <a:lnRef idx="2">
+            <a:schemeClr val="accent1">
+              <a:shade val="15000"/>
+            </a:schemeClr>
+          </a:lnRef>
+          <a:fillRef idx="1">
+            <a:schemeClr val="accent1"/>
+          </a:fillRef>
+          <a:effectRef idx="0">
+            <a:schemeClr val="accent1"/>
+          </a:effectRef>
+          <a:fontRef idx="minor">
+            <a:schemeClr val="lt1"/>
+          </a:fontRef>
+        </p:style>
+        <p:txBody>
+          <a:bodyPr rtlCol="0" anchor="ctr"/>
+          <a:lstStyle/>
+          <a:p>
+            <a:pPr algn="ctr"/>
+            <a:endParaRPr lang="en-GB" dirty="0"/>
+          </a:p>
+        </p:txBody>
+      </p:sp>
+      <p:sp>
+        <p:nvSpPr>
+          <p:cNvPr id="6" name="Rectangle 5">
+            <a:extLst>
+              <a:ext uri="{FF2B5EF4-FFF2-40B4-BE49-F238E27FC236}">
+                <a16:creationId xmlns:a16="http://schemas.microsoft.com/office/drawing/2014/main" id="{4644B4F7-85A6-6513-BBF3-362CED42C826}"/>
+              </a:ext>
+            </a:extLst>
+          </p:cNvPr>
+          <p:cNvSpPr/>
+          <p:nvPr userDrawn="1"/>
+        </p:nvSpPr>
+        <p:spPr>
+          <a:xfrm>
+            <a:off x="0" y="0"/>
+            <a:ext cx="12192000" cy="581487"/>
+          </a:xfrm>
+          <a:prstGeom prst="rect">
+            <a:avLst/>
+          </a:prstGeom>
+          <a:solidFill>
+            <a:srgbClr val="3C7D3D"/>
+          </a:solidFill>
+          <a:ln>
+            <a:noFill/>
+          </a:ln>
+        </p:spPr>
+        <p:style>
+          <a:lnRef idx="2">
+            <a:schemeClr val="accent1">
+              <a:shade val="15000"/>
+            </a:schemeClr>
+          </a:lnRef>
+          <a:fillRef idx="1">
+            <a:schemeClr val="accent1"/>
+          </a:fillRef>
+          <a:effectRef idx="0">
+            <a:schemeClr val="accent1"/>
+          </a:effectRef>
+          <a:fontRef idx="minor">
+            <a:schemeClr val="lt1"/>
+          </a:fontRef>
+        </p:style>
+        <p:txBody>
+          <a:bodyPr rtlCol="0" anchor="ctr"/>
+          <a:lstStyle/>
+          <a:p>
+            <a:pPr algn="ctr"/>
+            <a:endParaRPr lang="en-GB"/>
+          </a:p>
+        </p:txBody>
+      </p:sp>
+      <p:sp>
+        <p:nvSpPr>
+          <p:cNvPr id="7" name="TextBox 6">
+            <a:extLst>
+              <a:ext uri="{FF2B5EF4-FFF2-40B4-BE49-F238E27FC236}">
+                <a16:creationId xmlns:a16="http://schemas.microsoft.com/office/drawing/2014/main" id="{AC79D996-4385-8D5B-0E46-CCEF84A5CDA1}"/>
+              </a:ext>
+            </a:extLst>
+          </p:cNvPr>
+          <p:cNvSpPr txBox="1"/>
+          <p:nvPr userDrawn="1"/>
+        </p:nvSpPr>
+        <p:spPr>
+          <a:xfrm>
+            <a:off x="4302688" y="6468675"/>
+            <a:ext cx="3586623" cy="276999"/>
+          </a:xfrm>
+          <a:prstGeom prst="rect">
+            <a:avLst/>
+          </a:prstGeom>
+          <a:noFill/>
+        </p:spPr>
+        <p:txBody>
+          <a:bodyPr wrap="none" rtlCol="0">
+            <a:spAutoFit/>
+          </a:bodyPr>
+          <a:lstStyle/>
+          <a:p>
+            <a:r>
+              <a:rPr lang="en-GB" sz="1200" dirty="0">
+                <a:solidFill>
+                  <a:schemeClr val="bg1"/>
+                </a:solidFill>
+              </a:rPr>
+              <a:t>APYT – Présentation </a:t>
+            </a:r>
+            <a:r>
+              <a:rPr lang="en-GB" sz="1200" dirty="0" err="1">
+                <a:solidFill>
+                  <a:schemeClr val="bg1"/>
+                </a:solidFill>
+              </a:rPr>
+              <a:t>Projet</a:t>
+            </a:r>
+            <a:r>
+              <a:rPr lang="en-GB" sz="1200" dirty="0">
+                <a:solidFill>
+                  <a:schemeClr val="bg1"/>
+                </a:solidFill>
+              </a:rPr>
+              <a:t> – </a:t>
+            </a:r>
+            <a:r>
+              <a:rPr lang="en-GB" sz="1200" dirty="0" err="1">
+                <a:solidFill>
+                  <a:schemeClr val="bg1"/>
+                </a:solidFill>
+              </a:rPr>
+              <a:t>LinearRegression</a:t>
+            </a:r>
+            <a:r>
+              <a:rPr lang="en-GB" sz="1200" dirty="0">
+                <a:solidFill>
+                  <a:schemeClr val="bg1"/>
+                </a:solidFill>
+              </a:rPr>
+              <a:t> Module</a:t>
+            </a:r>
+          </a:p>
+        </p:txBody>
+      </p:sp>
+      <p:sp>
+        <p:nvSpPr>
+          <p:cNvPr id="8" name="TextBox 7">
+            <a:extLst>
+              <a:ext uri="{FF2B5EF4-FFF2-40B4-BE49-F238E27FC236}">
+                <a16:creationId xmlns:a16="http://schemas.microsoft.com/office/drawing/2014/main" id="{53772F2E-BCEC-7C6F-9B33-6697584E3994}"/>
+              </a:ext>
+            </a:extLst>
+          </p:cNvPr>
+          <p:cNvSpPr txBox="1"/>
+          <p:nvPr userDrawn="1"/>
+        </p:nvSpPr>
+        <p:spPr>
+          <a:xfrm>
+            <a:off x="555917" y="6468674"/>
+            <a:ext cx="931665" cy="276999"/>
+          </a:xfrm>
+          <a:prstGeom prst="rect">
+            <a:avLst/>
+          </a:prstGeom>
+          <a:noFill/>
+        </p:spPr>
+        <p:txBody>
+          <a:bodyPr wrap="none" rtlCol="0">
+            <a:spAutoFit/>
+          </a:bodyPr>
+          <a:lstStyle>
+            <a:defPPr>
+              <a:defRPr lang="en-US"/>
+            </a:defPPr>
+            <a:lvl1pPr>
+              <a:defRPr sz="1200">
+                <a:solidFill>
+                  <a:schemeClr val="bg1"/>
+                </a:solidFill>
+              </a:defRPr>
+            </a:lvl1pPr>
+          </a:lstStyle>
+          <a:p>
+            <a:pPr lvl="0"/>
+            <a:r>
+              <a:rPr lang="en-GB" dirty="0"/>
+              <a:t>24/01/2025</a:t>
+            </a:r>
+          </a:p>
+        </p:txBody>
+      </p:sp>
+      <p:sp>
+        <p:nvSpPr>
+          <p:cNvPr id="14" name="Title 13">
+            <a:extLst>
+              <a:ext uri="{FF2B5EF4-FFF2-40B4-BE49-F238E27FC236}">
+                <a16:creationId xmlns:a16="http://schemas.microsoft.com/office/drawing/2014/main" id="{39B7DCE8-F7E0-26E5-7D92-CE15FD200798}"/>
               </a:ext>
             </a:extLst>
           </p:cNvPr>
@@ -2054,28 +2554,43 @@
             <a:spLocks noGrp="1"/>
           </p:cNvSpPr>
           <p:nvPr>
-            <p:ph type="dt" sz="half" idx="10"/>
+            <p:ph type="title"/>
           </p:nvPr>
         </p:nvSpPr>
-        <p:spPr/>
-        <p:txBody>
-          <a:bodyPr/>
-          <a:lstStyle/>
-          <a:p>
-            <a:fld id="{A54CE22A-A271-4833-999D-90A3D050652D}" type="datetimeFigureOut">
-              <a:rPr lang="en-GB" smtClean="0"/>
-              <a:t>22/01/2025</a:t>
-            </a:fld>
-            <a:endParaRPr lang="en-GB"/>
-          </a:p>
-        </p:txBody>
-      </p:sp>
-      <p:sp>
-        <p:nvSpPr>
-          <p:cNvPr id="3" name="Footer Placeholder 2">
-            <a:extLst>
-              <a:ext uri="{FF2B5EF4-FFF2-40B4-BE49-F238E27FC236}">
-                <a16:creationId xmlns:a16="http://schemas.microsoft.com/office/drawing/2014/main" id="{B8B5F07D-1901-DE85-D82A-C847E2CD26B0}"/>
+        <p:spPr>
+          <a:xfrm>
+            <a:off x="0" y="12610"/>
+            <a:ext cx="10515600" cy="679848"/>
+          </a:xfrm>
+        </p:spPr>
+        <p:txBody>
+          <a:bodyPr>
+            <a:normAutofit/>
+          </a:bodyPr>
+          <a:lstStyle>
+            <a:lvl1pPr>
+              <a:defRPr sz="3200">
+                <a:solidFill>
+                  <a:schemeClr val="bg1"/>
+                </a:solidFill>
+                <a:latin typeface="Arial Black" panose="020B0A04020102020204" pitchFamily="34" charset="0"/>
+              </a:defRPr>
+            </a:lvl1pPr>
+          </a:lstStyle>
+          <a:p>
+            <a:r>
+              <a:rPr lang="en-GB" dirty="0"/>
+              <a:t>Click to edit Master title style</a:t>
+            </a:r>
+          </a:p>
+        </p:txBody>
+      </p:sp>
+      <p:sp>
+        <p:nvSpPr>
+          <p:cNvPr id="16" name="Text Placeholder 15">
+            <a:extLst>
+              <a:ext uri="{FF2B5EF4-FFF2-40B4-BE49-F238E27FC236}">
+                <a16:creationId xmlns:a16="http://schemas.microsoft.com/office/drawing/2014/main" id="{A1002410-C5CC-D1A4-4184-C411DBF301DB}"/>
               </a:ext>
             </a:extLst>
           </p:cNvPr>
@@ -2083,44 +2598,41 @@
             <a:spLocks noGrp="1"/>
           </p:cNvSpPr>
           <p:nvPr>
-            <p:ph type="ftr" sz="quarter" idx="11"/>
+            <p:ph type="body" sz="quarter" idx="10" hasCustomPrompt="1"/>
           </p:nvPr>
         </p:nvSpPr>
-        <p:spPr/>
-        <p:txBody>
-          <a:bodyPr/>
-          <a:lstStyle/>
-          <a:p>
-            <a:endParaRPr lang="en-GB"/>
-          </a:p>
-        </p:txBody>
-      </p:sp>
-      <p:sp>
-        <p:nvSpPr>
-          <p:cNvPr id="4" name="Slide Number Placeholder 3">
-            <a:extLst>
-              <a:ext uri="{FF2B5EF4-FFF2-40B4-BE49-F238E27FC236}">
-                <a16:creationId xmlns:a16="http://schemas.microsoft.com/office/drawing/2014/main" id="{F8AFA078-5333-DB6B-285A-4F7FA0A9B958}"/>
-              </a:ext>
-            </a:extLst>
-          </p:cNvPr>
-          <p:cNvSpPr>
-            <a:spLocks noGrp="1"/>
-          </p:cNvSpPr>
-          <p:nvPr>
-            <p:ph type="sldNum" sz="quarter" idx="12"/>
-          </p:nvPr>
-        </p:nvSpPr>
-        <p:spPr/>
-        <p:txBody>
-          <a:bodyPr/>
-          <a:lstStyle/>
-          <a:p>
-            <a:fld id="{9C776F3C-6170-4CFA-981E-E57EE68DA2DA}" type="slidenum">
-              <a:rPr lang="en-GB" smtClean="0"/>
-              <a:t>‹#›</a:t>
-            </a:fld>
-            <a:endParaRPr lang="en-GB"/>
+        <p:spPr>
+          <a:xfrm>
+            <a:off x="0" y="581487"/>
+            <a:ext cx="5717558" cy="410457"/>
+          </a:xfrm>
+        </p:spPr>
+        <p:txBody>
+          <a:bodyPr>
+            <a:normAutofit/>
+          </a:bodyPr>
+          <a:lstStyle>
+            <a:lvl1pPr marL="0" indent="0">
+              <a:buNone/>
+              <a:defRPr sz="2000">
+                <a:solidFill>
+                  <a:schemeClr val="bg1"/>
+                </a:solidFill>
+                <a:latin typeface="Arial" panose="020B0604020202020204" pitchFamily="34" charset="0"/>
+                <a:cs typeface="Arial" panose="020B0604020202020204" pitchFamily="34" charset="0"/>
+              </a:defRPr>
+            </a:lvl1pPr>
+            <a:lvl5pPr marL="1828800" indent="0">
+              <a:buNone/>
+              <a:defRPr/>
+            </a:lvl5pPr>
+          </a:lstStyle>
+          <a:p>
+            <a:pPr lvl="0"/>
+            <a:r>
+              <a:rPr lang="en-GB" dirty="0"/>
+              <a:t>Click to edit subtitle</a:t>
+            </a:r>
           </a:p>
         </p:txBody>
       </p:sp>
@@ -2134,6 +2646,7 @@
   <p:clrMapOvr>
     <a:masterClrMapping/>
   </p:clrMapOvr>
+  <p:hf hdr="0" ftr="0" dt="0"/>
 </p:sldLayout>
 </file>
 
@@ -2375,7 +2888,7 @@
           <a:p>
             <a:fld id="{A54CE22A-A271-4833-999D-90A3D050652D}" type="datetimeFigureOut">
               <a:rPr lang="en-GB" smtClean="0"/>
-              <a:t>22/01/2025</a:t>
+              <a:t>24/01/2025</a:t>
             </a:fld>
             <a:endParaRPr lang="en-GB"/>
           </a:p>
@@ -2663,7 +3176,7 @@
           <a:p>
             <a:fld id="{A54CE22A-A271-4833-999D-90A3D050652D}" type="datetimeFigureOut">
               <a:rPr lang="en-GB" smtClean="0"/>
-              <a:t>22/01/2025</a:t>
+              <a:t>24/01/2025</a:t>
             </a:fld>
             <a:endParaRPr lang="en-GB"/>
           </a:p>
@@ -2904,7 +3417,7 @@
           <a:p>
             <a:fld id="{A54CE22A-A271-4833-999D-90A3D050652D}" type="datetimeFigureOut">
               <a:rPr lang="en-GB" smtClean="0"/>
-              <a:t>22/01/2025</a:t>
+              <a:t>24/01/2025</a:t>
             </a:fld>
             <a:endParaRPr lang="en-GB"/>
           </a:p>
@@ -3321,12 +3834,373 @@
           <a:chExt cx="0" cy="0"/>
         </a:xfrm>
       </p:grpSpPr>
+      <p:sp>
+        <p:nvSpPr>
+          <p:cNvPr id="2" name="TextBox 1">
+            <a:extLst>
+              <a:ext uri="{FF2B5EF4-FFF2-40B4-BE49-F238E27FC236}">
+                <a16:creationId xmlns:a16="http://schemas.microsoft.com/office/drawing/2014/main" id="{1F1F6C77-6FB7-D9E1-93D5-7747D061074B}"/>
+              </a:ext>
+            </a:extLst>
+          </p:cNvPr>
+          <p:cNvSpPr txBox="1"/>
+          <p:nvPr/>
+        </p:nvSpPr>
+        <p:spPr>
+          <a:xfrm>
+            <a:off x="659877" y="2644170"/>
+            <a:ext cx="5423985" cy="1661993"/>
+          </a:xfrm>
+          <a:prstGeom prst="rect">
+            <a:avLst/>
+          </a:prstGeom>
+          <a:noFill/>
+        </p:spPr>
+        <p:txBody>
+          <a:bodyPr wrap="none" rtlCol="0">
+            <a:spAutoFit/>
+          </a:bodyPr>
+          <a:lstStyle/>
+          <a:p>
+            <a:r>
+              <a:rPr lang="en-GB" sz="3200" b="1" dirty="0">
+                <a:solidFill>
+                  <a:schemeClr val="bg1"/>
+                </a:solidFill>
+                <a:latin typeface="Arial Black" panose="020B0A04020102020204" pitchFamily="34" charset="0"/>
+              </a:rPr>
+              <a:t>Présentation</a:t>
+            </a:r>
+          </a:p>
+          <a:p>
+            <a:r>
+              <a:rPr lang="en-GB" b="1" dirty="0">
+                <a:solidFill>
+                  <a:schemeClr val="bg1"/>
+                </a:solidFill>
+                <a:latin typeface="Arial Black" panose="020B0A04020102020204" pitchFamily="34" charset="0"/>
+              </a:rPr>
+              <a:t> </a:t>
+            </a:r>
+          </a:p>
+          <a:p>
+            <a:r>
+              <a:rPr lang="en-GB" sz="2600" b="1" dirty="0" err="1">
+                <a:solidFill>
+                  <a:schemeClr val="bg1"/>
+                </a:solidFill>
+                <a:latin typeface="Arial Black" panose="020B0A04020102020204" pitchFamily="34" charset="0"/>
+              </a:rPr>
+              <a:t>Création</a:t>
+            </a:r>
+            <a:r>
+              <a:rPr lang="en-GB" sz="2600" b="1" dirty="0">
+                <a:solidFill>
+                  <a:schemeClr val="bg1"/>
+                </a:solidFill>
+                <a:latin typeface="Arial Black" panose="020B0A04020102020204" pitchFamily="34" charset="0"/>
+              </a:rPr>
+              <a:t> d’un module Python</a:t>
+            </a:r>
+          </a:p>
+          <a:p>
+            <a:r>
+              <a:rPr lang="en-GB" sz="2600" b="1" dirty="0" err="1">
+                <a:solidFill>
+                  <a:schemeClr val="bg1"/>
+                </a:solidFill>
+                <a:latin typeface="Arial Black" panose="020B0A04020102020204" pitchFamily="34" charset="0"/>
+              </a:rPr>
+              <a:t>LinearRegression</a:t>
+            </a:r>
+            <a:endParaRPr lang="en-GB" sz="2600" b="1" dirty="0">
+              <a:solidFill>
+                <a:schemeClr val="bg1"/>
+              </a:solidFill>
+              <a:latin typeface="Arial Black" panose="020B0A04020102020204" pitchFamily="34" charset="0"/>
+            </a:endParaRPr>
+          </a:p>
+        </p:txBody>
+      </p:sp>
       <p:pic>
         <p:nvPicPr>
-          <p:cNvPr id="5" name="Picture 4">
-            <a:extLst>
-              <a:ext uri="{FF2B5EF4-FFF2-40B4-BE49-F238E27FC236}">
-                <a16:creationId xmlns:a16="http://schemas.microsoft.com/office/drawing/2014/main" id="{B163F7FF-CB91-8632-253E-29B82942CCBE}"/>
+          <p:cNvPr id="3074" name="Picture 2" descr="Official fuel consumption figures and WLTP | The AA">
+            <a:extLst>
+              <a:ext uri="{FF2B5EF4-FFF2-40B4-BE49-F238E27FC236}">
+                <a16:creationId xmlns:a16="http://schemas.microsoft.com/office/drawing/2014/main" id="{0D7CFFCB-502F-1A17-1CBB-7DCF68E3F685}"/>
+              </a:ext>
+            </a:extLst>
+          </p:cNvPr>
+          <p:cNvPicPr>
+            <a:picLocks noChangeAspect="1" noChangeArrowheads="1"/>
+          </p:cNvPicPr>
+          <p:nvPr/>
+        </p:nvPicPr>
+        <p:blipFill>
+          <a:blip r:embed="rId2">
+            <a:extLst>
+              <a:ext uri="{28A0092B-C50C-407E-A947-70E740481C1C}">
+                <a14:useLocalDpi xmlns:a14="http://schemas.microsoft.com/office/drawing/2010/main" val="0"/>
+              </a:ext>
+            </a:extLst>
+          </a:blip>
+          <a:srcRect/>
+          <a:stretch>
+            <a:fillRect/>
+          </a:stretch>
+        </p:blipFill>
+        <p:spPr bwMode="auto">
+          <a:xfrm>
+            <a:off x="7024835" y="2113568"/>
+            <a:ext cx="4514850" cy="2819400"/>
+          </a:xfrm>
+          <a:prstGeom prst="rect">
+            <a:avLst/>
+          </a:prstGeom>
+          <a:noFill/>
+          <a:extLst>
+            <a:ext uri="{909E8E84-426E-40DD-AFC4-6F175D3DCCD1}">
+              <a14:hiddenFill xmlns:a14="http://schemas.microsoft.com/office/drawing/2010/main">
+                <a:solidFill>
+                  <a:srgbClr val="FFFFFF"/>
+                </a:solidFill>
+              </a14:hiddenFill>
+            </a:ext>
+          </a:extLst>
+        </p:spPr>
+      </p:pic>
+    </p:spTree>
+    <p:extLst>
+      <p:ext uri="{BB962C8B-B14F-4D97-AF65-F5344CB8AC3E}">
+        <p14:creationId xmlns:p14="http://schemas.microsoft.com/office/powerpoint/2010/main" val="2986141393"/>
+      </p:ext>
+    </p:extLst>
+  </p:cSld>
+  <p:clrMapOvr>
+    <a:masterClrMapping/>
+  </p:clrMapOvr>
+</p:sld>
+</file>
+
+<file path=ppt/slides/slide2.xml><?xml version="1.0" encoding="utf-8"?>
+<p:sld xmlns:a="http://schemas.openxmlformats.org/drawingml/2006/main" xmlns:r="http://schemas.openxmlformats.org/officeDocument/2006/relationships" xmlns:p="http://schemas.openxmlformats.org/presentationml/2006/main">
+  <p:cSld>
+    <p:spTree>
+      <p:nvGrpSpPr>
+        <p:cNvPr id="1" name=""/>
+        <p:cNvGrpSpPr/>
+        <p:nvPr/>
+      </p:nvGrpSpPr>
+      <p:grpSpPr>
+        <a:xfrm>
+          <a:off x="0" y="0"/>
+          <a:ext cx="0" cy="0"/>
+          <a:chOff x="0" y="0"/>
+          <a:chExt cx="0" cy="0"/>
+        </a:xfrm>
+      </p:grpSpPr>
+      <p:sp>
+        <p:nvSpPr>
+          <p:cNvPr id="6" name="TextBox 5">
+            <a:extLst>
+              <a:ext uri="{FF2B5EF4-FFF2-40B4-BE49-F238E27FC236}">
+                <a16:creationId xmlns:a16="http://schemas.microsoft.com/office/drawing/2014/main" id="{96801E3F-A6A9-E416-F649-25E10510C741}"/>
+              </a:ext>
+            </a:extLst>
+          </p:cNvPr>
+          <p:cNvSpPr txBox="1"/>
+          <p:nvPr/>
+        </p:nvSpPr>
+        <p:spPr>
+          <a:xfrm>
+            <a:off x="235670" y="75414"/>
+            <a:ext cx="1882375" cy="461665"/>
+          </a:xfrm>
+          <a:prstGeom prst="rect">
+            <a:avLst/>
+          </a:prstGeom>
+          <a:noFill/>
+        </p:spPr>
+        <p:txBody>
+          <a:bodyPr wrap="none" rtlCol="0">
+            <a:spAutoFit/>
+          </a:bodyPr>
+          <a:lstStyle/>
+          <a:p>
+            <a:r>
+              <a:rPr lang="en-GB" sz="2400" dirty="0" err="1">
+                <a:solidFill>
+                  <a:schemeClr val="bg1"/>
+                </a:solidFill>
+                <a:latin typeface="Arial Black" panose="020B0A04020102020204" pitchFamily="34" charset="0"/>
+              </a:rPr>
+              <a:t>Sommaire</a:t>
+            </a:r>
+            <a:endParaRPr lang="en-GB" sz="2400" dirty="0">
+              <a:solidFill>
+                <a:schemeClr val="bg1"/>
+              </a:solidFill>
+              <a:latin typeface="Arial Black" panose="020B0A04020102020204" pitchFamily="34" charset="0"/>
+            </a:endParaRPr>
+          </a:p>
+        </p:txBody>
+      </p:sp>
+      <p:sp>
+        <p:nvSpPr>
+          <p:cNvPr id="7" name="TextBox 6">
+            <a:extLst>
+              <a:ext uri="{FF2B5EF4-FFF2-40B4-BE49-F238E27FC236}">
+                <a16:creationId xmlns:a16="http://schemas.microsoft.com/office/drawing/2014/main" id="{2D4FA74B-DD8C-5BF8-BE93-0F60399584D7}"/>
+              </a:ext>
+            </a:extLst>
+          </p:cNvPr>
+          <p:cNvSpPr txBox="1"/>
+          <p:nvPr/>
+        </p:nvSpPr>
+        <p:spPr>
+          <a:xfrm>
+            <a:off x="1448766" y="1759631"/>
+            <a:ext cx="4647234" cy="3338735"/>
+          </a:xfrm>
+          <a:prstGeom prst="rect">
+            <a:avLst/>
+          </a:prstGeom>
+          <a:noFill/>
+        </p:spPr>
+        <p:txBody>
+          <a:bodyPr wrap="none" rtlCol="0">
+            <a:spAutoFit/>
+          </a:bodyPr>
+          <a:lstStyle/>
+          <a:p>
+            <a:pPr marL="342900" indent="-342900">
+              <a:lnSpc>
+                <a:spcPct val="200000"/>
+              </a:lnSpc>
+              <a:buAutoNum type="arabicPeriod"/>
+            </a:pPr>
+            <a:r>
+              <a:rPr lang="en-GB" b="1" dirty="0" err="1"/>
+              <a:t>Fonctionnalités</a:t>
+            </a:r>
+            <a:r>
+              <a:rPr lang="en-GB" b="1" dirty="0"/>
+              <a:t> de la </a:t>
+            </a:r>
+            <a:r>
+              <a:rPr lang="en-GB" b="1" dirty="0" err="1"/>
+              <a:t>classe</a:t>
+            </a:r>
+            <a:endParaRPr lang="en-GB" b="1" dirty="0"/>
+          </a:p>
+          <a:p>
+            <a:pPr marL="342900" indent="-342900">
+              <a:lnSpc>
+                <a:spcPct val="200000"/>
+              </a:lnSpc>
+              <a:buAutoNum type="arabicPeriod"/>
+            </a:pPr>
+            <a:r>
+              <a:rPr lang="en-GB" b="1" dirty="0"/>
+              <a:t>Toy dataset</a:t>
+            </a:r>
+          </a:p>
+          <a:p>
+            <a:pPr marL="342900" indent="-342900">
+              <a:lnSpc>
+                <a:spcPct val="200000"/>
+              </a:lnSpc>
+              <a:buAutoNum type="arabicPeriod"/>
+            </a:pPr>
+            <a:r>
+              <a:rPr lang="en-GB" b="1" dirty="0"/>
+              <a:t>Fuel Consumption Dataset</a:t>
+            </a:r>
+          </a:p>
+          <a:p>
+            <a:pPr marL="857250" lvl="1" indent="-400050">
+              <a:lnSpc>
+                <a:spcPct val="200000"/>
+              </a:lnSpc>
+              <a:buFont typeface="+mj-lt"/>
+              <a:buAutoNum type="romanLcPeriod"/>
+            </a:pPr>
+            <a:r>
+              <a:rPr lang="en-GB" b="1" dirty="0"/>
+              <a:t>Exploration &amp; </a:t>
+            </a:r>
+            <a:r>
+              <a:rPr lang="en-GB" b="1" dirty="0" err="1"/>
+              <a:t>Nettoyage</a:t>
+            </a:r>
+            <a:r>
+              <a:rPr lang="en-GB" b="1" dirty="0"/>
+              <a:t> des données</a:t>
+            </a:r>
+          </a:p>
+          <a:p>
+            <a:pPr marL="857250" lvl="1" indent="-400050">
+              <a:lnSpc>
+                <a:spcPct val="200000"/>
+              </a:lnSpc>
+              <a:buFont typeface="+mj-lt"/>
+              <a:buAutoNum type="romanLcPeriod"/>
+            </a:pPr>
+            <a:r>
+              <a:rPr lang="en-GB" b="1" dirty="0" err="1"/>
+              <a:t>Modèles</a:t>
+            </a:r>
+            <a:r>
+              <a:rPr lang="en-GB" b="1" dirty="0"/>
+              <a:t> de </a:t>
+            </a:r>
+            <a:r>
+              <a:rPr lang="en-GB" b="1" dirty="0" err="1"/>
+              <a:t>régression</a:t>
+            </a:r>
+            <a:r>
+              <a:rPr lang="en-GB" b="1" dirty="0"/>
+              <a:t> </a:t>
+            </a:r>
+            <a:r>
+              <a:rPr lang="en-GB" b="1" dirty="0" err="1"/>
+              <a:t>linéaire</a:t>
+            </a:r>
+            <a:r>
+              <a:rPr lang="en-GB" b="1" dirty="0"/>
+              <a:t> </a:t>
+            </a:r>
+          </a:p>
+          <a:p>
+            <a:pPr marL="857250" lvl="1" indent="-400050">
+              <a:lnSpc>
+                <a:spcPct val="200000"/>
+              </a:lnSpc>
+              <a:buFont typeface="+mj-lt"/>
+              <a:buAutoNum type="romanLcPeriod"/>
+            </a:pPr>
+            <a:r>
+              <a:rPr lang="en-GB" b="1" dirty="0" err="1"/>
+              <a:t>Comparaison</a:t>
+            </a:r>
+            <a:r>
+              <a:rPr lang="en-GB" b="1" dirty="0"/>
+              <a:t> des </a:t>
+            </a:r>
+            <a:r>
+              <a:rPr lang="en-GB" b="1" dirty="0" err="1"/>
+              <a:t>résultats</a:t>
+            </a:r>
+            <a:endParaRPr lang="en-GB" b="1" dirty="0"/>
+          </a:p>
+        </p:txBody>
+      </p:sp>
+      <p:pic>
+        <p:nvPicPr>
+          <p:cNvPr id="8" name="Picture 7">
+            <a:extLst>
+              <a:ext uri="{FF2B5EF4-FFF2-40B4-BE49-F238E27FC236}">
+                <a16:creationId xmlns:a16="http://schemas.microsoft.com/office/drawing/2014/main" id="{7F0CD255-7798-AD61-92DA-22AD22065954}"/>
               </a:ext>
             </a:extLst>
           </p:cNvPr>
@@ -3343,18 +4217,2552 @@
         </p:blipFill>
         <p:spPr>
           <a:xfrm>
-            <a:off x="5344998" y="796584"/>
-            <a:ext cx="5911513" cy="5264832"/>
+            <a:off x="6601387" y="2138728"/>
+            <a:ext cx="5174776" cy="2580543"/>
           </a:xfrm>
           <a:prstGeom prst="rect">
             <a:avLst/>
           </a:prstGeom>
         </p:spPr>
       </p:pic>
+      <p:sp>
+        <p:nvSpPr>
+          <p:cNvPr id="9" name="TextBox 8">
+            <a:extLst>
+              <a:ext uri="{FF2B5EF4-FFF2-40B4-BE49-F238E27FC236}">
+                <a16:creationId xmlns:a16="http://schemas.microsoft.com/office/drawing/2014/main" id="{4EDB1D2F-C177-DC28-1819-1200C0F934FF}"/>
+              </a:ext>
+            </a:extLst>
+          </p:cNvPr>
+          <p:cNvSpPr txBox="1"/>
+          <p:nvPr/>
+        </p:nvSpPr>
+        <p:spPr>
+          <a:xfrm>
+            <a:off x="11756566" y="6370320"/>
+            <a:ext cx="301686" cy="369332"/>
+          </a:xfrm>
+          <a:prstGeom prst="rect">
+            <a:avLst/>
+          </a:prstGeom>
+          <a:noFill/>
+        </p:spPr>
+        <p:txBody>
+          <a:bodyPr wrap="none" rtlCol="0">
+            <a:spAutoFit/>
+          </a:bodyPr>
+          <a:lstStyle/>
+          <a:p>
+            <a:r>
+              <a:rPr lang="en-GB" dirty="0">
+                <a:solidFill>
+                  <a:schemeClr val="bg1"/>
+                </a:solidFill>
+              </a:rPr>
+              <a:t>1</a:t>
+            </a:r>
+          </a:p>
+        </p:txBody>
+      </p:sp>
     </p:spTree>
     <p:extLst>
       <p:ext uri="{BB962C8B-B14F-4D97-AF65-F5344CB8AC3E}">
-        <p14:creationId xmlns:p14="http://schemas.microsoft.com/office/powerpoint/2010/main" val="2986141393"/>
+        <p14:creationId xmlns:p14="http://schemas.microsoft.com/office/powerpoint/2010/main" val="3136885286"/>
+      </p:ext>
+    </p:extLst>
+  </p:cSld>
+  <p:clrMapOvr>
+    <a:masterClrMapping/>
+  </p:clrMapOvr>
+</p:sld>
+</file>
+
+<file path=ppt/slides/slide3.xml><?xml version="1.0" encoding="utf-8"?>
+<p:sld xmlns:a="http://schemas.openxmlformats.org/drawingml/2006/main" xmlns:r="http://schemas.openxmlformats.org/officeDocument/2006/relationships" xmlns:p="http://schemas.openxmlformats.org/presentationml/2006/main">
+  <p:cSld>
+    <p:spTree>
+      <p:nvGrpSpPr>
+        <p:cNvPr id="1" name="">
+          <a:extLst>
+            <a:ext uri="{FF2B5EF4-FFF2-40B4-BE49-F238E27FC236}">
+              <a16:creationId xmlns:a16="http://schemas.microsoft.com/office/drawing/2014/main" id="{E5F45CCD-6BD4-1EE3-E857-4B97954B1B8C}"/>
+            </a:ext>
+          </a:extLst>
+        </p:cNvPr>
+        <p:cNvGrpSpPr/>
+        <p:nvPr/>
+      </p:nvGrpSpPr>
+      <p:grpSpPr>
+        <a:xfrm>
+          <a:off x="0" y="0"/>
+          <a:ext cx="0" cy="0"/>
+          <a:chOff x="0" y="0"/>
+          <a:chExt cx="0" cy="0"/>
+        </a:xfrm>
+      </p:grpSpPr>
+      <p:sp>
+        <p:nvSpPr>
+          <p:cNvPr id="6" name="TextBox 5">
+            <a:extLst>
+              <a:ext uri="{FF2B5EF4-FFF2-40B4-BE49-F238E27FC236}">
+                <a16:creationId xmlns:a16="http://schemas.microsoft.com/office/drawing/2014/main" id="{0037F403-5557-C7D7-5190-9D0621485545}"/>
+              </a:ext>
+            </a:extLst>
+          </p:cNvPr>
+          <p:cNvSpPr txBox="1"/>
+          <p:nvPr/>
+        </p:nvSpPr>
+        <p:spPr>
+          <a:xfrm>
+            <a:off x="235670" y="75414"/>
+            <a:ext cx="5310236" cy="461665"/>
+          </a:xfrm>
+          <a:prstGeom prst="rect">
+            <a:avLst/>
+          </a:prstGeom>
+          <a:noFill/>
+        </p:spPr>
+        <p:txBody>
+          <a:bodyPr wrap="none" rtlCol="0">
+            <a:spAutoFit/>
+          </a:bodyPr>
+          <a:lstStyle/>
+          <a:p>
+            <a:r>
+              <a:rPr lang="en-GB" sz="2400" dirty="0">
+                <a:solidFill>
+                  <a:schemeClr val="bg1"/>
+                </a:solidFill>
+                <a:latin typeface="Arial Black" panose="020B0A04020102020204" pitchFamily="34" charset="0"/>
+              </a:rPr>
+              <a:t>1. </a:t>
+            </a:r>
+            <a:r>
+              <a:rPr lang="en-GB" sz="2400" dirty="0" err="1">
+                <a:solidFill>
+                  <a:schemeClr val="bg1"/>
+                </a:solidFill>
+                <a:latin typeface="Arial Black" panose="020B0A04020102020204" pitchFamily="34" charset="0"/>
+              </a:rPr>
+              <a:t>Fonctionnalités</a:t>
+            </a:r>
+            <a:r>
+              <a:rPr lang="en-GB" sz="2400" dirty="0">
+                <a:solidFill>
+                  <a:schemeClr val="bg1"/>
+                </a:solidFill>
+                <a:latin typeface="Arial Black" panose="020B0A04020102020204" pitchFamily="34" charset="0"/>
+              </a:rPr>
+              <a:t> de la </a:t>
+            </a:r>
+            <a:r>
+              <a:rPr lang="en-GB" sz="2400" dirty="0" err="1">
+                <a:solidFill>
+                  <a:schemeClr val="bg1"/>
+                </a:solidFill>
+                <a:latin typeface="Arial Black" panose="020B0A04020102020204" pitchFamily="34" charset="0"/>
+              </a:rPr>
+              <a:t>classe</a:t>
+            </a:r>
+            <a:endParaRPr lang="en-GB" sz="2400" dirty="0">
+              <a:solidFill>
+                <a:schemeClr val="bg1"/>
+              </a:solidFill>
+              <a:latin typeface="Arial Black" panose="020B0A04020102020204" pitchFamily="34" charset="0"/>
+            </a:endParaRPr>
+          </a:p>
+        </p:txBody>
+      </p:sp>
+      <p:sp>
+        <p:nvSpPr>
+          <p:cNvPr id="2" name="TextBox 1">
+            <a:extLst>
+              <a:ext uri="{FF2B5EF4-FFF2-40B4-BE49-F238E27FC236}">
+                <a16:creationId xmlns:a16="http://schemas.microsoft.com/office/drawing/2014/main" id="{AE33DE01-A2C9-941A-8B07-286794EF647A}"/>
+              </a:ext>
+            </a:extLst>
+          </p:cNvPr>
+          <p:cNvSpPr txBox="1"/>
+          <p:nvPr/>
+        </p:nvSpPr>
+        <p:spPr>
+          <a:xfrm>
+            <a:off x="337538" y="1296527"/>
+            <a:ext cx="3549241" cy="4247317"/>
+          </a:xfrm>
+          <a:prstGeom prst="rect">
+            <a:avLst/>
+          </a:prstGeom>
+          <a:noFill/>
+        </p:spPr>
+        <p:txBody>
+          <a:bodyPr wrap="none" rtlCol="0">
+            <a:spAutoFit/>
+          </a:bodyPr>
+          <a:lstStyle/>
+          <a:p>
+            <a:r>
+              <a:rPr lang="en-GB" b="1" dirty="0" err="1"/>
+              <a:t>Possibilté</a:t>
+            </a:r>
+            <a:r>
+              <a:rPr lang="en-GB" b="1" dirty="0"/>
+              <a:t> de </a:t>
+            </a:r>
+            <a:r>
+              <a:rPr lang="en-GB" b="1" dirty="0" err="1"/>
+              <a:t>choisir</a:t>
+            </a:r>
+            <a:r>
+              <a:rPr lang="en-GB" b="1" dirty="0"/>
+              <a:t> un </a:t>
+            </a:r>
+            <a:r>
+              <a:rPr lang="en-GB" b="1" dirty="0" err="1"/>
+              <a:t>modèle</a:t>
+            </a:r>
+            <a:r>
+              <a:rPr lang="en-GB" b="1" dirty="0"/>
+              <a:t> </a:t>
+            </a:r>
+            <a:r>
+              <a:rPr lang="en-GB" b="1" i="1" dirty="0"/>
+              <a:t>fit()</a:t>
+            </a:r>
+            <a:endParaRPr lang="en-GB" b="1" dirty="0"/>
+          </a:p>
+          <a:p>
+            <a:pPr marL="285750" indent="-285750">
+              <a:buFont typeface="Wingdings" panose="05000000000000000000" pitchFamily="2" charset="2"/>
+              <a:buChar char="à"/>
+            </a:pPr>
+            <a:r>
+              <a:rPr lang="en-GB" dirty="0">
+                <a:sym typeface="Wingdings" panose="05000000000000000000" pitchFamily="2" charset="2"/>
+              </a:rPr>
+              <a:t>Classic, LASSO, RIDGE, ELASTIC</a:t>
+            </a:r>
+          </a:p>
+          <a:p>
+            <a:r>
+              <a:rPr lang="en-GB" b="1" dirty="0">
+                <a:sym typeface="Wingdings" panose="05000000000000000000" pitchFamily="2" charset="2"/>
+              </a:rPr>
+              <a:t>Normalisation par feature</a:t>
+            </a:r>
+          </a:p>
+          <a:p>
+            <a:r>
+              <a:rPr lang="en-GB" b="1" dirty="0" err="1">
+                <a:sym typeface="Wingdings" panose="05000000000000000000" pitchFamily="2" charset="2"/>
+              </a:rPr>
+              <a:t>Biais</a:t>
+            </a:r>
+            <a:endParaRPr lang="en-GB" b="1" dirty="0">
+              <a:sym typeface="Wingdings" panose="05000000000000000000" pitchFamily="2" charset="2"/>
+            </a:endParaRPr>
+          </a:p>
+          <a:p>
+            <a:endParaRPr lang="en-GB" dirty="0"/>
+          </a:p>
+          <a:p>
+            <a:r>
+              <a:rPr lang="en-GB" b="1" dirty="0" err="1"/>
+              <a:t>Affichage</a:t>
+            </a:r>
+            <a:r>
+              <a:rPr lang="en-GB" b="1" dirty="0"/>
+              <a:t> des </a:t>
+            </a:r>
+            <a:r>
+              <a:rPr lang="en-GB" b="1" dirty="0" err="1"/>
+              <a:t>métriques</a:t>
+            </a:r>
+            <a:endParaRPr lang="en-GB" b="1" dirty="0"/>
+          </a:p>
+          <a:p>
+            <a:pPr marL="285750" indent="-285750">
+              <a:buFont typeface="Wingdings" panose="05000000000000000000" pitchFamily="2" charset="2"/>
+              <a:buChar char="à"/>
+            </a:pPr>
+            <a:r>
+              <a:rPr lang="en-GB" dirty="0">
+                <a:sym typeface="Wingdings" panose="05000000000000000000" pitchFamily="2" charset="2"/>
+              </a:rPr>
+              <a:t>Feature importance</a:t>
+            </a:r>
+          </a:p>
+          <a:p>
+            <a:pPr marL="285750" indent="-285750">
+              <a:buFont typeface="Wingdings" panose="05000000000000000000" pitchFamily="2" charset="2"/>
+              <a:buChar char="à"/>
+            </a:pPr>
+            <a:r>
+              <a:rPr lang="en-GB" dirty="0" err="1">
+                <a:sym typeface="Wingdings" panose="05000000000000000000" pitchFamily="2" charset="2"/>
+              </a:rPr>
+              <a:t>Fonction</a:t>
+            </a:r>
+            <a:r>
+              <a:rPr lang="en-GB" dirty="0">
+                <a:sym typeface="Wingdings" panose="05000000000000000000" pitchFamily="2" charset="2"/>
+              </a:rPr>
+              <a:t> </a:t>
+            </a:r>
+            <a:r>
+              <a:rPr lang="en-GB" dirty="0" err="1">
+                <a:sym typeface="Wingdings" panose="05000000000000000000" pitchFamily="2" charset="2"/>
+              </a:rPr>
+              <a:t>coût</a:t>
+            </a:r>
+            <a:endParaRPr lang="en-GB" dirty="0">
+              <a:sym typeface="Wingdings" panose="05000000000000000000" pitchFamily="2" charset="2"/>
+            </a:endParaRPr>
+          </a:p>
+          <a:p>
+            <a:pPr marL="285750" indent="-285750">
+              <a:buFont typeface="Wingdings" panose="05000000000000000000" pitchFamily="2" charset="2"/>
+              <a:buChar char="à"/>
+            </a:pPr>
+            <a:r>
+              <a:rPr lang="en-GB" dirty="0" err="1">
+                <a:sym typeface="Wingdings" panose="05000000000000000000" pitchFamily="2" charset="2"/>
+              </a:rPr>
+              <a:t>Précision</a:t>
+            </a:r>
+            <a:r>
+              <a:rPr lang="en-GB" dirty="0">
+                <a:sym typeface="Wingdings" panose="05000000000000000000" pitchFamily="2" charset="2"/>
+              </a:rPr>
+              <a:t> de la prediction</a:t>
+            </a:r>
+          </a:p>
+          <a:p>
+            <a:pPr marL="285750" indent="-285750">
+              <a:buFont typeface="Wingdings" panose="05000000000000000000" pitchFamily="2" charset="2"/>
+              <a:buChar char="à"/>
+            </a:pPr>
+            <a:endParaRPr lang="en-GB" dirty="0">
+              <a:sym typeface="Wingdings" panose="05000000000000000000" pitchFamily="2" charset="2"/>
+            </a:endParaRPr>
+          </a:p>
+          <a:p>
+            <a:r>
+              <a:rPr lang="en-GB" b="1" dirty="0" err="1"/>
+              <a:t>Calcul</a:t>
+            </a:r>
+            <a:r>
+              <a:rPr lang="en-GB" b="1" dirty="0"/>
+              <a:t> du score</a:t>
+            </a:r>
+          </a:p>
+          <a:p>
+            <a:endParaRPr lang="en-GB" b="1" dirty="0"/>
+          </a:p>
+          <a:p>
+            <a:r>
+              <a:rPr lang="en-GB" b="1" dirty="0" err="1"/>
+              <a:t>Accès</a:t>
+            </a:r>
+            <a:r>
+              <a:rPr lang="en-GB" b="1" dirty="0"/>
+              <a:t> aux coefficients du </a:t>
+            </a:r>
+            <a:r>
+              <a:rPr lang="en-GB" b="1" dirty="0" err="1"/>
+              <a:t>modèle</a:t>
+            </a:r>
+            <a:endParaRPr lang="en-GB" b="1" dirty="0"/>
+          </a:p>
+          <a:p>
+            <a:endParaRPr lang="en-GB" b="1" dirty="0"/>
+          </a:p>
+          <a:p>
+            <a:r>
+              <a:rPr lang="en-GB" b="1" strike="sngStrike" dirty="0"/>
+              <a:t>Gestion des outliers</a:t>
+            </a:r>
+          </a:p>
+        </p:txBody>
+      </p:sp>
+      <p:pic>
+        <p:nvPicPr>
+          <p:cNvPr id="4" name="Picture 3">
+            <a:extLst>
+              <a:ext uri="{FF2B5EF4-FFF2-40B4-BE49-F238E27FC236}">
+                <a16:creationId xmlns:a16="http://schemas.microsoft.com/office/drawing/2014/main" id="{6E674F27-6001-E185-F20F-B1F318781723}"/>
+              </a:ext>
+            </a:extLst>
+          </p:cNvPr>
+          <p:cNvPicPr>
+            <a:picLocks noChangeAspect="1"/>
+          </p:cNvPicPr>
+          <p:nvPr/>
+        </p:nvPicPr>
+        <p:blipFill>
+          <a:blip r:embed="rId2"/>
+          <a:stretch>
+            <a:fillRect/>
+          </a:stretch>
+        </p:blipFill>
+        <p:spPr>
+          <a:xfrm>
+            <a:off x="6462034" y="1314154"/>
+            <a:ext cx="5268060" cy="4229690"/>
+          </a:xfrm>
+          <a:prstGeom prst="rect">
+            <a:avLst/>
+          </a:prstGeom>
+        </p:spPr>
+      </p:pic>
+      <p:sp>
+        <p:nvSpPr>
+          <p:cNvPr id="5" name="TextBox 4">
+            <a:extLst>
+              <a:ext uri="{FF2B5EF4-FFF2-40B4-BE49-F238E27FC236}">
+                <a16:creationId xmlns:a16="http://schemas.microsoft.com/office/drawing/2014/main" id="{DAE07D73-ACAF-7562-C697-BA2E4AA3652B}"/>
+              </a:ext>
+            </a:extLst>
+          </p:cNvPr>
+          <p:cNvSpPr txBox="1"/>
+          <p:nvPr/>
+        </p:nvSpPr>
+        <p:spPr>
+          <a:xfrm>
+            <a:off x="11756566" y="6370320"/>
+            <a:ext cx="301686" cy="369332"/>
+          </a:xfrm>
+          <a:prstGeom prst="rect">
+            <a:avLst/>
+          </a:prstGeom>
+          <a:noFill/>
+        </p:spPr>
+        <p:txBody>
+          <a:bodyPr wrap="none" rtlCol="0">
+            <a:spAutoFit/>
+          </a:bodyPr>
+          <a:lstStyle/>
+          <a:p>
+            <a:r>
+              <a:rPr lang="en-GB" dirty="0">
+                <a:solidFill>
+                  <a:schemeClr val="bg1"/>
+                </a:solidFill>
+              </a:rPr>
+              <a:t>2</a:t>
+            </a:r>
+          </a:p>
+        </p:txBody>
+      </p:sp>
+    </p:spTree>
+    <p:extLst>
+      <p:ext uri="{BB962C8B-B14F-4D97-AF65-F5344CB8AC3E}">
+        <p14:creationId xmlns:p14="http://schemas.microsoft.com/office/powerpoint/2010/main" val="1258465323"/>
+      </p:ext>
+    </p:extLst>
+  </p:cSld>
+  <p:clrMapOvr>
+    <a:masterClrMapping/>
+  </p:clrMapOvr>
+</p:sld>
+</file>
+
+<file path=ppt/slides/slide4.xml><?xml version="1.0" encoding="utf-8"?>
+<p:sld xmlns:a="http://schemas.openxmlformats.org/drawingml/2006/main" xmlns:r="http://schemas.openxmlformats.org/officeDocument/2006/relationships" xmlns:p="http://schemas.openxmlformats.org/presentationml/2006/main">
+  <p:cSld>
+    <p:spTree>
+      <p:nvGrpSpPr>
+        <p:cNvPr id="1" name="">
+          <a:extLst>
+            <a:ext uri="{FF2B5EF4-FFF2-40B4-BE49-F238E27FC236}">
+              <a16:creationId xmlns:a16="http://schemas.microsoft.com/office/drawing/2014/main" id="{C3FD8042-09F3-52B5-EC8C-9376E620AF17}"/>
+            </a:ext>
+          </a:extLst>
+        </p:cNvPr>
+        <p:cNvGrpSpPr/>
+        <p:nvPr/>
+      </p:nvGrpSpPr>
+      <p:grpSpPr>
+        <a:xfrm>
+          <a:off x="0" y="0"/>
+          <a:ext cx="0" cy="0"/>
+          <a:chOff x="0" y="0"/>
+          <a:chExt cx="0" cy="0"/>
+        </a:xfrm>
+      </p:grpSpPr>
+      <p:sp>
+        <p:nvSpPr>
+          <p:cNvPr id="6" name="TextBox 5">
+            <a:extLst>
+              <a:ext uri="{FF2B5EF4-FFF2-40B4-BE49-F238E27FC236}">
+                <a16:creationId xmlns:a16="http://schemas.microsoft.com/office/drawing/2014/main" id="{60A88C7D-1C21-C422-CA24-C5D46461D2F7}"/>
+              </a:ext>
+            </a:extLst>
+          </p:cNvPr>
+          <p:cNvSpPr txBox="1"/>
+          <p:nvPr/>
+        </p:nvSpPr>
+        <p:spPr>
+          <a:xfrm>
+            <a:off x="235670" y="75414"/>
+            <a:ext cx="2659895" cy="461665"/>
+          </a:xfrm>
+          <a:prstGeom prst="rect">
+            <a:avLst/>
+          </a:prstGeom>
+          <a:noFill/>
+        </p:spPr>
+        <p:txBody>
+          <a:bodyPr wrap="none" rtlCol="0">
+            <a:spAutoFit/>
+          </a:bodyPr>
+          <a:lstStyle/>
+          <a:p>
+            <a:r>
+              <a:rPr lang="en-GB" sz="2400" dirty="0">
+                <a:solidFill>
+                  <a:schemeClr val="bg1"/>
+                </a:solidFill>
+                <a:latin typeface="Arial Black" panose="020B0A04020102020204" pitchFamily="34" charset="0"/>
+              </a:rPr>
+              <a:t>2. TOY dataset</a:t>
+            </a:r>
+          </a:p>
+        </p:txBody>
+      </p:sp>
+      <p:pic>
+        <p:nvPicPr>
+          <p:cNvPr id="5" name="Picture 4">
+            <a:extLst>
+              <a:ext uri="{FF2B5EF4-FFF2-40B4-BE49-F238E27FC236}">
+                <a16:creationId xmlns:a16="http://schemas.microsoft.com/office/drawing/2014/main" id="{3440F646-F0BD-EC5D-E71D-C1E5ED18F049}"/>
+              </a:ext>
+            </a:extLst>
+          </p:cNvPr>
+          <p:cNvPicPr>
+            <a:picLocks noChangeAspect="1"/>
+          </p:cNvPicPr>
+          <p:nvPr/>
+        </p:nvPicPr>
+        <p:blipFill>
+          <a:blip r:embed="rId2"/>
+          <a:stretch>
+            <a:fillRect/>
+          </a:stretch>
+        </p:blipFill>
+        <p:spPr>
+          <a:xfrm>
+            <a:off x="1207285" y="2174269"/>
+            <a:ext cx="4686954" cy="3334215"/>
+          </a:xfrm>
+          <a:prstGeom prst="rect">
+            <a:avLst/>
+          </a:prstGeom>
+        </p:spPr>
+      </p:pic>
+      <p:pic>
+        <p:nvPicPr>
+          <p:cNvPr id="9" name="Picture 8">
+            <a:extLst>
+              <a:ext uri="{FF2B5EF4-FFF2-40B4-BE49-F238E27FC236}">
+                <a16:creationId xmlns:a16="http://schemas.microsoft.com/office/drawing/2014/main" id="{4E7450E0-5C9C-DDDD-EBEB-EFA55802B0EA}"/>
+              </a:ext>
+            </a:extLst>
+          </p:cNvPr>
+          <p:cNvPicPr>
+            <a:picLocks noChangeAspect="1"/>
+          </p:cNvPicPr>
+          <p:nvPr/>
+        </p:nvPicPr>
+        <p:blipFill>
+          <a:blip r:embed="rId3"/>
+          <a:stretch>
+            <a:fillRect/>
+          </a:stretch>
+        </p:blipFill>
+        <p:spPr>
+          <a:xfrm>
+            <a:off x="6911565" y="2383848"/>
+            <a:ext cx="4353533" cy="3124636"/>
+          </a:xfrm>
+          <a:prstGeom prst="rect">
+            <a:avLst/>
+          </a:prstGeom>
+        </p:spPr>
+      </p:pic>
+      <p:pic>
+        <p:nvPicPr>
+          <p:cNvPr id="11" name="Picture 10">
+            <a:extLst>
+              <a:ext uri="{FF2B5EF4-FFF2-40B4-BE49-F238E27FC236}">
+                <a16:creationId xmlns:a16="http://schemas.microsoft.com/office/drawing/2014/main" id="{66497432-17E5-6A81-A438-ADED8B27D986}"/>
+              </a:ext>
+            </a:extLst>
+          </p:cNvPr>
+          <p:cNvPicPr>
+            <a:picLocks noChangeAspect="1"/>
+          </p:cNvPicPr>
+          <p:nvPr/>
+        </p:nvPicPr>
+        <p:blipFill>
+          <a:blip r:embed="rId4"/>
+          <a:stretch>
+            <a:fillRect/>
+          </a:stretch>
+        </p:blipFill>
+        <p:spPr>
+          <a:xfrm>
+            <a:off x="0" y="947031"/>
+            <a:ext cx="12192000" cy="1230923"/>
+          </a:xfrm>
+          <a:prstGeom prst="rect">
+            <a:avLst/>
+          </a:prstGeom>
+        </p:spPr>
+      </p:pic>
+      <p:sp>
+        <p:nvSpPr>
+          <p:cNvPr id="12" name="TextBox 11">
+            <a:extLst>
+              <a:ext uri="{FF2B5EF4-FFF2-40B4-BE49-F238E27FC236}">
+                <a16:creationId xmlns:a16="http://schemas.microsoft.com/office/drawing/2014/main" id="{546C91A1-7863-110B-4DA9-4AEAD14F1FED}"/>
+              </a:ext>
+            </a:extLst>
+          </p:cNvPr>
+          <p:cNvSpPr txBox="1"/>
+          <p:nvPr/>
+        </p:nvSpPr>
+        <p:spPr>
+          <a:xfrm>
+            <a:off x="1470581" y="5797485"/>
+            <a:ext cx="4931093" cy="369332"/>
+          </a:xfrm>
+          <a:prstGeom prst="rect">
+            <a:avLst/>
+          </a:prstGeom>
+          <a:noFill/>
+        </p:spPr>
+        <p:txBody>
+          <a:bodyPr wrap="none" rtlCol="0">
+            <a:spAutoFit/>
+          </a:bodyPr>
+          <a:lstStyle/>
+          <a:p>
+            <a:r>
+              <a:rPr lang="en-GB" dirty="0">
+                <a:sym typeface="Wingdings" panose="05000000000000000000" pitchFamily="2" charset="2"/>
+              </a:rPr>
+              <a:t> </a:t>
+            </a:r>
+            <a:r>
+              <a:rPr lang="en-GB" dirty="0" err="1">
+                <a:sym typeface="Wingdings" panose="05000000000000000000" pitchFamily="2" charset="2"/>
+              </a:rPr>
+              <a:t>Vérification</a:t>
+            </a:r>
+            <a:r>
+              <a:rPr lang="en-GB" dirty="0">
+                <a:sym typeface="Wingdings" panose="05000000000000000000" pitchFamily="2" charset="2"/>
+              </a:rPr>
+              <a:t> du bon </a:t>
+            </a:r>
+            <a:r>
+              <a:rPr lang="en-GB" dirty="0" err="1">
+                <a:sym typeface="Wingdings" panose="05000000000000000000" pitchFamily="2" charset="2"/>
+              </a:rPr>
+              <a:t>fonctionnement</a:t>
+            </a:r>
+            <a:r>
+              <a:rPr lang="en-GB" dirty="0">
+                <a:sym typeface="Wingdings" panose="05000000000000000000" pitchFamily="2" charset="2"/>
+              </a:rPr>
+              <a:t> de la </a:t>
+            </a:r>
+            <a:r>
+              <a:rPr lang="en-GB" dirty="0" err="1">
+                <a:sym typeface="Wingdings" panose="05000000000000000000" pitchFamily="2" charset="2"/>
+              </a:rPr>
+              <a:t>classe</a:t>
+            </a:r>
+            <a:endParaRPr lang="en-GB" dirty="0"/>
+          </a:p>
+        </p:txBody>
+      </p:sp>
+      <p:sp>
+        <p:nvSpPr>
+          <p:cNvPr id="13" name="TextBox 12">
+            <a:extLst>
+              <a:ext uri="{FF2B5EF4-FFF2-40B4-BE49-F238E27FC236}">
+                <a16:creationId xmlns:a16="http://schemas.microsoft.com/office/drawing/2014/main" id="{A5252AB9-8158-C796-D7B2-D38DA8A15239}"/>
+              </a:ext>
+            </a:extLst>
+          </p:cNvPr>
+          <p:cNvSpPr txBox="1"/>
+          <p:nvPr/>
+        </p:nvSpPr>
+        <p:spPr>
+          <a:xfrm>
+            <a:off x="11756566" y="6370320"/>
+            <a:ext cx="301686" cy="369332"/>
+          </a:xfrm>
+          <a:prstGeom prst="rect">
+            <a:avLst/>
+          </a:prstGeom>
+          <a:noFill/>
+        </p:spPr>
+        <p:txBody>
+          <a:bodyPr wrap="none" rtlCol="0">
+            <a:spAutoFit/>
+          </a:bodyPr>
+          <a:lstStyle/>
+          <a:p>
+            <a:r>
+              <a:rPr lang="en-GB" dirty="0">
+                <a:solidFill>
+                  <a:schemeClr val="bg1"/>
+                </a:solidFill>
+              </a:rPr>
+              <a:t>3</a:t>
+            </a:r>
+          </a:p>
+        </p:txBody>
+      </p:sp>
+    </p:spTree>
+    <p:extLst>
+      <p:ext uri="{BB962C8B-B14F-4D97-AF65-F5344CB8AC3E}">
+        <p14:creationId xmlns:p14="http://schemas.microsoft.com/office/powerpoint/2010/main" val="3261276705"/>
+      </p:ext>
+    </p:extLst>
+  </p:cSld>
+  <p:clrMapOvr>
+    <a:masterClrMapping/>
+  </p:clrMapOvr>
+</p:sld>
+</file>
+
+<file path=ppt/slides/slide5.xml><?xml version="1.0" encoding="utf-8"?>
+<p:sld xmlns:a="http://schemas.openxmlformats.org/drawingml/2006/main" xmlns:r="http://schemas.openxmlformats.org/officeDocument/2006/relationships" xmlns:p="http://schemas.openxmlformats.org/presentationml/2006/main">
+  <p:cSld>
+    <p:spTree>
+      <p:nvGrpSpPr>
+        <p:cNvPr id="1" name="">
+          <a:extLst>
+            <a:ext uri="{FF2B5EF4-FFF2-40B4-BE49-F238E27FC236}">
+              <a16:creationId xmlns:a16="http://schemas.microsoft.com/office/drawing/2014/main" id="{35A2BB3E-A859-0870-2547-ED693B7C6068}"/>
+            </a:ext>
+          </a:extLst>
+        </p:cNvPr>
+        <p:cNvGrpSpPr/>
+        <p:nvPr/>
+      </p:nvGrpSpPr>
+      <p:grpSpPr>
+        <a:xfrm>
+          <a:off x="0" y="0"/>
+          <a:ext cx="0" cy="0"/>
+          <a:chOff x="0" y="0"/>
+          <a:chExt cx="0" cy="0"/>
+        </a:xfrm>
+      </p:grpSpPr>
+      <p:sp>
+        <p:nvSpPr>
+          <p:cNvPr id="6" name="TextBox 5">
+            <a:extLst>
+              <a:ext uri="{FF2B5EF4-FFF2-40B4-BE49-F238E27FC236}">
+                <a16:creationId xmlns:a16="http://schemas.microsoft.com/office/drawing/2014/main" id="{0C5EB998-F0A0-B186-11F9-DB11970363E2}"/>
+              </a:ext>
+            </a:extLst>
+          </p:cNvPr>
+          <p:cNvSpPr txBox="1"/>
+          <p:nvPr/>
+        </p:nvSpPr>
+        <p:spPr>
+          <a:xfrm>
+            <a:off x="235670" y="75414"/>
+            <a:ext cx="5031698" cy="461665"/>
+          </a:xfrm>
+          <a:prstGeom prst="rect">
+            <a:avLst/>
+          </a:prstGeom>
+          <a:noFill/>
+        </p:spPr>
+        <p:txBody>
+          <a:bodyPr wrap="none" rtlCol="0">
+            <a:spAutoFit/>
+          </a:bodyPr>
+          <a:lstStyle/>
+          <a:p>
+            <a:r>
+              <a:rPr lang="en-GB" sz="2400" dirty="0">
+                <a:solidFill>
+                  <a:schemeClr val="bg1"/>
+                </a:solidFill>
+                <a:latin typeface="Arial Black" panose="020B0A04020102020204" pitchFamily="34" charset="0"/>
+              </a:rPr>
+              <a:t>3. Fuel Consumption Dataset</a:t>
+            </a:r>
+          </a:p>
+        </p:txBody>
+      </p:sp>
+      <p:pic>
+        <p:nvPicPr>
+          <p:cNvPr id="4" name="Picture 3">
+            <a:extLst>
+              <a:ext uri="{FF2B5EF4-FFF2-40B4-BE49-F238E27FC236}">
+                <a16:creationId xmlns:a16="http://schemas.microsoft.com/office/drawing/2014/main" id="{05456446-BF22-1D60-DD58-F5D43B9DE384}"/>
+              </a:ext>
+            </a:extLst>
+          </p:cNvPr>
+          <p:cNvPicPr>
+            <a:picLocks noChangeAspect="1"/>
+          </p:cNvPicPr>
+          <p:nvPr/>
+        </p:nvPicPr>
+        <p:blipFill>
+          <a:blip r:embed="rId2"/>
+          <a:stretch>
+            <a:fillRect/>
+          </a:stretch>
+        </p:blipFill>
+        <p:spPr>
+          <a:xfrm>
+            <a:off x="542041" y="1765169"/>
+            <a:ext cx="11107918" cy="2601070"/>
+          </a:xfrm>
+          <a:prstGeom prst="rect">
+            <a:avLst/>
+          </a:prstGeom>
+        </p:spPr>
+      </p:pic>
+      <p:sp>
+        <p:nvSpPr>
+          <p:cNvPr id="5" name="TextBox 4">
+            <a:extLst>
+              <a:ext uri="{FF2B5EF4-FFF2-40B4-BE49-F238E27FC236}">
+                <a16:creationId xmlns:a16="http://schemas.microsoft.com/office/drawing/2014/main" id="{CC748E02-7891-1835-135E-BF440ECC7910}"/>
+              </a:ext>
+            </a:extLst>
+          </p:cNvPr>
+          <p:cNvSpPr txBox="1"/>
+          <p:nvPr/>
+        </p:nvSpPr>
+        <p:spPr>
+          <a:xfrm>
+            <a:off x="542041" y="4407765"/>
+            <a:ext cx="2477473" cy="369332"/>
+          </a:xfrm>
+          <a:prstGeom prst="rect">
+            <a:avLst/>
+          </a:prstGeom>
+          <a:noFill/>
+        </p:spPr>
+        <p:txBody>
+          <a:bodyPr wrap="none" rtlCol="0">
+            <a:spAutoFit/>
+          </a:bodyPr>
+          <a:lstStyle/>
+          <a:p>
+            <a:r>
+              <a:rPr lang="en-GB" b="1" i="1" dirty="0"/>
+              <a:t>1067 rows × 13 columns</a:t>
+            </a:r>
+          </a:p>
+        </p:txBody>
+      </p:sp>
+      <p:sp>
+        <p:nvSpPr>
+          <p:cNvPr id="8" name="TextBox 7">
+            <a:extLst>
+              <a:ext uri="{FF2B5EF4-FFF2-40B4-BE49-F238E27FC236}">
+                <a16:creationId xmlns:a16="http://schemas.microsoft.com/office/drawing/2014/main" id="{AF5D3844-4F80-5623-1750-34B7C46CE51F}"/>
+              </a:ext>
+            </a:extLst>
+          </p:cNvPr>
+          <p:cNvSpPr txBox="1"/>
+          <p:nvPr/>
+        </p:nvSpPr>
+        <p:spPr>
+          <a:xfrm>
+            <a:off x="669303" y="5071621"/>
+            <a:ext cx="7472495" cy="923330"/>
+          </a:xfrm>
+          <a:prstGeom prst="rect">
+            <a:avLst/>
+          </a:prstGeom>
+          <a:noFill/>
+        </p:spPr>
+        <p:txBody>
+          <a:bodyPr wrap="none" rtlCol="0">
+            <a:spAutoFit/>
+          </a:bodyPr>
+          <a:lstStyle/>
+          <a:p>
+            <a:r>
+              <a:rPr lang="en-GB" b="1" u="sng" dirty="0"/>
+              <a:t>Première étape: </a:t>
+            </a:r>
+            <a:r>
+              <a:rPr lang="en-GB" dirty="0"/>
+              <a:t>Selection des variables </a:t>
+            </a:r>
+            <a:r>
+              <a:rPr lang="en-GB" dirty="0" err="1"/>
+              <a:t>explicatives</a:t>
+            </a:r>
+            <a:endParaRPr lang="en-GB" dirty="0"/>
+          </a:p>
+          <a:p>
+            <a:pPr marL="742950" lvl="1" indent="-285750">
+              <a:buFont typeface="Wingdings" panose="05000000000000000000" pitchFamily="2" charset="2"/>
+              <a:buChar char="à"/>
+            </a:pPr>
+            <a:r>
+              <a:rPr lang="en-GB" dirty="0">
+                <a:sym typeface="Wingdings" panose="05000000000000000000" pitchFamily="2" charset="2"/>
+              </a:rPr>
+              <a:t>Retire les données </a:t>
+            </a:r>
+            <a:r>
+              <a:rPr lang="en-GB" dirty="0" err="1">
+                <a:sym typeface="Wingdings" panose="05000000000000000000" pitchFamily="2" charset="2"/>
+              </a:rPr>
+              <a:t>textuelles</a:t>
+            </a:r>
+            <a:r>
+              <a:rPr lang="en-GB" dirty="0">
+                <a:sym typeface="Wingdings" panose="05000000000000000000" pitchFamily="2" charset="2"/>
+              </a:rPr>
+              <a:t> </a:t>
+            </a:r>
+            <a:r>
+              <a:rPr lang="en-GB" dirty="0" err="1">
+                <a:sym typeface="Wingdings" panose="05000000000000000000" pitchFamily="2" charset="2"/>
+              </a:rPr>
+              <a:t>comme</a:t>
+            </a:r>
+            <a:r>
+              <a:rPr lang="en-GB" dirty="0">
+                <a:sym typeface="Wingdings" panose="05000000000000000000" pitchFamily="2" charset="2"/>
+              </a:rPr>
+              <a:t> MAKE, MODEL &amp; VEHICLE CLASS</a:t>
+            </a:r>
+          </a:p>
+          <a:p>
+            <a:pPr marL="742950" lvl="1" indent="-285750">
+              <a:buFont typeface="Wingdings" panose="05000000000000000000" pitchFamily="2" charset="2"/>
+              <a:buChar char="à"/>
+            </a:pPr>
+            <a:r>
+              <a:rPr lang="en-GB" dirty="0">
+                <a:sym typeface="Wingdings" panose="05000000000000000000" pitchFamily="2" charset="2"/>
+              </a:rPr>
+              <a:t>MODELYEAR: pas utile dans </a:t>
+            </a:r>
+            <a:r>
+              <a:rPr lang="en-GB" dirty="0" err="1">
+                <a:sym typeface="Wingdings" panose="05000000000000000000" pitchFamily="2" charset="2"/>
+              </a:rPr>
+              <a:t>notre</a:t>
+            </a:r>
+            <a:r>
+              <a:rPr lang="en-GB" dirty="0">
+                <a:sym typeface="Wingdings" panose="05000000000000000000" pitchFamily="2" charset="2"/>
+              </a:rPr>
+              <a:t> étude</a:t>
+            </a:r>
+            <a:endParaRPr lang="en-GB" dirty="0"/>
+          </a:p>
+        </p:txBody>
+      </p:sp>
+      <p:sp>
+        <p:nvSpPr>
+          <p:cNvPr id="9" name="TextBox 8">
+            <a:extLst>
+              <a:ext uri="{FF2B5EF4-FFF2-40B4-BE49-F238E27FC236}">
+                <a16:creationId xmlns:a16="http://schemas.microsoft.com/office/drawing/2014/main" id="{F601FEBD-4C74-7D38-F8D7-E916CFBBE23A}"/>
+              </a:ext>
+            </a:extLst>
+          </p:cNvPr>
+          <p:cNvSpPr txBox="1"/>
+          <p:nvPr/>
+        </p:nvSpPr>
+        <p:spPr>
+          <a:xfrm>
+            <a:off x="453708" y="663745"/>
+            <a:ext cx="9370514" cy="923330"/>
+          </a:xfrm>
+          <a:prstGeom prst="rect">
+            <a:avLst/>
+          </a:prstGeom>
+          <a:noFill/>
+        </p:spPr>
+        <p:txBody>
+          <a:bodyPr wrap="none" rtlCol="0">
+            <a:spAutoFit/>
+          </a:bodyPr>
+          <a:lstStyle/>
+          <a:p>
+            <a:r>
+              <a:rPr lang="en-GB" b="1" u="sng" dirty="0" err="1"/>
+              <a:t>Problème</a:t>
+            </a:r>
+            <a:r>
+              <a:rPr lang="en-GB" b="1" u="sng" dirty="0"/>
+              <a:t> à </a:t>
+            </a:r>
+            <a:r>
+              <a:rPr lang="en-GB" b="1" u="sng" dirty="0" err="1"/>
+              <a:t>résoudre</a:t>
+            </a:r>
+            <a:r>
+              <a:rPr lang="en-GB" b="1" u="sng" dirty="0"/>
+              <a:t>:</a:t>
+            </a:r>
+          </a:p>
+          <a:p>
+            <a:r>
+              <a:rPr lang="en-GB" b="1" dirty="0">
+                <a:sym typeface="Wingdings" panose="05000000000000000000" pitchFamily="2" charset="2"/>
+              </a:rPr>
+              <a:t> Point de </a:t>
+            </a:r>
+            <a:r>
+              <a:rPr lang="en-GB" b="1" dirty="0" err="1">
+                <a:sym typeface="Wingdings" panose="05000000000000000000" pitchFamily="2" charset="2"/>
+              </a:rPr>
+              <a:t>vue</a:t>
+            </a:r>
+            <a:r>
+              <a:rPr lang="en-GB" b="1" dirty="0">
+                <a:sym typeface="Wingdings" panose="05000000000000000000" pitchFamily="2" charset="2"/>
+              </a:rPr>
+              <a:t> d’un </a:t>
+            </a:r>
+            <a:r>
+              <a:rPr lang="en-GB" b="1" dirty="0" err="1">
+                <a:sym typeface="Wingdings" panose="05000000000000000000" pitchFamily="2" charset="2"/>
+              </a:rPr>
+              <a:t>régulateur</a:t>
+            </a:r>
+            <a:r>
+              <a:rPr lang="en-GB" b="1" dirty="0">
+                <a:sym typeface="Wingdings" panose="05000000000000000000" pitchFamily="2" charset="2"/>
+              </a:rPr>
+              <a:t> </a:t>
+            </a:r>
+            <a:r>
+              <a:rPr lang="en-GB" b="1" dirty="0" err="1">
+                <a:sym typeface="Wingdings" panose="05000000000000000000" pitchFamily="2" charset="2"/>
+              </a:rPr>
+              <a:t>Crit’Air</a:t>
+            </a:r>
+            <a:endParaRPr lang="en-GB" b="1" dirty="0"/>
+          </a:p>
+          <a:p>
+            <a:r>
+              <a:rPr lang="en-GB" dirty="0">
+                <a:solidFill>
+                  <a:srgbClr val="00B0F0"/>
+                </a:solidFill>
+                <a:sym typeface="Wingdings" panose="05000000000000000000" pitchFamily="2" charset="2"/>
+              </a:rPr>
+              <a:t> </a:t>
+            </a:r>
+            <a:r>
+              <a:rPr lang="en-GB" dirty="0" err="1">
+                <a:solidFill>
+                  <a:srgbClr val="00B0F0"/>
+                </a:solidFill>
+                <a:sym typeface="Wingdings" panose="05000000000000000000" pitchFamily="2" charset="2"/>
+              </a:rPr>
+              <a:t>Peut</a:t>
+            </a:r>
+            <a:r>
+              <a:rPr lang="en-GB" dirty="0">
+                <a:solidFill>
+                  <a:srgbClr val="00B0F0"/>
+                </a:solidFill>
+                <a:sym typeface="Wingdings" panose="05000000000000000000" pitchFamily="2" charset="2"/>
+              </a:rPr>
+              <a:t>-on </a:t>
+            </a:r>
+            <a:r>
+              <a:rPr lang="en-GB" dirty="0" err="1">
+                <a:solidFill>
+                  <a:srgbClr val="00B0F0"/>
+                </a:solidFill>
+                <a:sym typeface="Wingdings" panose="05000000000000000000" pitchFamily="2" charset="2"/>
+              </a:rPr>
+              <a:t>prédire</a:t>
+            </a:r>
+            <a:r>
+              <a:rPr lang="en-GB" dirty="0">
+                <a:solidFill>
+                  <a:srgbClr val="00B0F0"/>
+                </a:solidFill>
+                <a:sym typeface="Wingdings" panose="05000000000000000000" pitchFamily="2" charset="2"/>
+              </a:rPr>
+              <a:t> les </a:t>
+            </a:r>
+            <a:r>
+              <a:rPr lang="en-GB" dirty="0" err="1">
+                <a:solidFill>
+                  <a:srgbClr val="00B0F0"/>
+                </a:solidFill>
+                <a:sym typeface="Wingdings" panose="05000000000000000000" pitchFamily="2" charset="2"/>
+              </a:rPr>
+              <a:t>émissions</a:t>
+            </a:r>
+            <a:r>
+              <a:rPr lang="en-GB" dirty="0">
+                <a:solidFill>
+                  <a:srgbClr val="00B0F0"/>
+                </a:solidFill>
+                <a:sym typeface="Wingdings" panose="05000000000000000000" pitchFamily="2" charset="2"/>
+              </a:rPr>
+              <a:t> </a:t>
+            </a:r>
+            <a:r>
+              <a:rPr lang="en-GB" dirty="0" err="1">
+                <a:solidFill>
+                  <a:srgbClr val="00B0F0"/>
+                </a:solidFill>
+                <a:sym typeface="Wingdings" panose="05000000000000000000" pitchFamily="2" charset="2"/>
+              </a:rPr>
+              <a:t>moyennes</a:t>
+            </a:r>
+            <a:r>
+              <a:rPr lang="en-GB" dirty="0">
+                <a:solidFill>
+                  <a:srgbClr val="00B0F0"/>
+                </a:solidFill>
+                <a:sym typeface="Wingdings" panose="05000000000000000000" pitchFamily="2" charset="2"/>
+              </a:rPr>
+              <a:t> d’un </a:t>
+            </a:r>
+            <a:r>
+              <a:rPr lang="en-GB" dirty="0" err="1">
+                <a:solidFill>
+                  <a:srgbClr val="00B0F0"/>
+                </a:solidFill>
+                <a:sym typeface="Wingdings" panose="05000000000000000000" pitchFamily="2" charset="2"/>
+              </a:rPr>
+              <a:t>véhicule</a:t>
+            </a:r>
+            <a:r>
+              <a:rPr lang="en-GB" dirty="0">
+                <a:solidFill>
+                  <a:srgbClr val="00B0F0"/>
+                </a:solidFill>
+                <a:sym typeface="Wingdings" panose="05000000000000000000" pitchFamily="2" charset="2"/>
+              </a:rPr>
+              <a:t> à </a:t>
+            </a:r>
+            <a:r>
+              <a:rPr lang="en-GB" dirty="0" err="1">
+                <a:solidFill>
+                  <a:srgbClr val="00B0F0"/>
+                </a:solidFill>
+                <a:sym typeface="Wingdings" panose="05000000000000000000" pitchFamily="2" charset="2"/>
+              </a:rPr>
+              <a:t>partir</a:t>
+            </a:r>
+            <a:r>
+              <a:rPr lang="en-GB" dirty="0">
+                <a:solidFill>
+                  <a:srgbClr val="00B0F0"/>
+                </a:solidFill>
+                <a:sym typeface="Wingdings" panose="05000000000000000000" pitchFamily="2" charset="2"/>
+              </a:rPr>
+              <a:t> de </a:t>
+            </a:r>
+            <a:r>
+              <a:rPr lang="en-GB" dirty="0" err="1">
+                <a:solidFill>
+                  <a:srgbClr val="00B0F0"/>
+                </a:solidFill>
+                <a:sym typeface="Wingdings" panose="05000000000000000000" pitchFamily="2" charset="2"/>
+              </a:rPr>
+              <a:t>ses</a:t>
+            </a:r>
+            <a:r>
+              <a:rPr lang="en-GB" dirty="0">
+                <a:solidFill>
+                  <a:srgbClr val="00B0F0"/>
+                </a:solidFill>
+                <a:sym typeface="Wingdings" panose="05000000000000000000" pitchFamily="2" charset="2"/>
+              </a:rPr>
+              <a:t> </a:t>
+            </a:r>
+            <a:r>
+              <a:rPr lang="en-GB" dirty="0" err="1">
+                <a:solidFill>
+                  <a:srgbClr val="00B0F0"/>
+                </a:solidFill>
+                <a:sym typeface="Wingdings" panose="05000000000000000000" pitchFamily="2" charset="2"/>
+              </a:rPr>
+              <a:t>caractéristiques</a:t>
+            </a:r>
+            <a:r>
+              <a:rPr lang="en-GB" dirty="0">
+                <a:solidFill>
+                  <a:srgbClr val="00B0F0"/>
+                </a:solidFill>
+                <a:sym typeface="Wingdings" panose="05000000000000000000" pitchFamily="2" charset="2"/>
+              </a:rPr>
+              <a:t> </a:t>
+            </a:r>
+            <a:r>
+              <a:rPr lang="en-GB" dirty="0" err="1">
+                <a:solidFill>
+                  <a:srgbClr val="00B0F0"/>
+                </a:solidFill>
+                <a:sym typeface="Wingdings" panose="05000000000000000000" pitchFamily="2" charset="2"/>
+              </a:rPr>
+              <a:t>moteur</a:t>
+            </a:r>
+            <a:r>
+              <a:rPr lang="en-GB" dirty="0">
+                <a:solidFill>
+                  <a:srgbClr val="00B0F0"/>
+                </a:solidFill>
+                <a:sym typeface="Wingdings" panose="05000000000000000000" pitchFamily="2" charset="2"/>
+              </a:rPr>
+              <a:t> ?</a:t>
+            </a:r>
+            <a:endParaRPr lang="en-GB" dirty="0">
+              <a:solidFill>
+                <a:srgbClr val="00B0F0"/>
+              </a:solidFill>
+            </a:endParaRPr>
+          </a:p>
+        </p:txBody>
+      </p:sp>
+      <p:sp>
+        <p:nvSpPr>
+          <p:cNvPr id="10" name="TextBox 9">
+            <a:extLst>
+              <a:ext uri="{FF2B5EF4-FFF2-40B4-BE49-F238E27FC236}">
+                <a16:creationId xmlns:a16="http://schemas.microsoft.com/office/drawing/2014/main" id="{5923F37D-AE81-1573-5E5B-74B8DF09C402}"/>
+              </a:ext>
+            </a:extLst>
+          </p:cNvPr>
+          <p:cNvSpPr txBox="1"/>
+          <p:nvPr/>
+        </p:nvSpPr>
+        <p:spPr>
+          <a:xfrm>
+            <a:off x="11756566" y="6370320"/>
+            <a:ext cx="301686" cy="369332"/>
+          </a:xfrm>
+          <a:prstGeom prst="rect">
+            <a:avLst/>
+          </a:prstGeom>
+          <a:noFill/>
+        </p:spPr>
+        <p:txBody>
+          <a:bodyPr wrap="none" rtlCol="0">
+            <a:spAutoFit/>
+          </a:bodyPr>
+          <a:lstStyle/>
+          <a:p>
+            <a:r>
+              <a:rPr lang="en-GB" dirty="0">
+                <a:solidFill>
+                  <a:schemeClr val="bg1"/>
+                </a:solidFill>
+              </a:rPr>
+              <a:t>4</a:t>
+            </a:r>
+          </a:p>
+        </p:txBody>
+      </p:sp>
+    </p:spTree>
+    <p:extLst>
+      <p:ext uri="{BB962C8B-B14F-4D97-AF65-F5344CB8AC3E}">
+        <p14:creationId xmlns:p14="http://schemas.microsoft.com/office/powerpoint/2010/main" val="357919965"/>
+      </p:ext>
+    </p:extLst>
+  </p:cSld>
+  <p:clrMapOvr>
+    <a:masterClrMapping/>
+  </p:clrMapOvr>
+</p:sld>
+</file>
+
+<file path=ppt/slides/slide6.xml><?xml version="1.0" encoding="utf-8"?>
+<p:sld xmlns:a="http://schemas.openxmlformats.org/drawingml/2006/main" xmlns:r="http://schemas.openxmlformats.org/officeDocument/2006/relationships" xmlns:p="http://schemas.openxmlformats.org/presentationml/2006/main">
+  <p:cSld>
+    <p:spTree>
+      <p:nvGrpSpPr>
+        <p:cNvPr id="1" name="">
+          <a:extLst>
+            <a:ext uri="{FF2B5EF4-FFF2-40B4-BE49-F238E27FC236}">
+              <a16:creationId xmlns:a16="http://schemas.microsoft.com/office/drawing/2014/main" id="{829E5BED-29E0-B104-7ED4-E3303479E15D}"/>
+            </a:ext>
+          </a:extLst>
+        </p:cNvPr>
+        <p:cNvGrpSpPr/>
+        <p:nvPr/>
+      </p:nvGrpSpPr>
+      <p:grpSpPr>
+        <a:xfrm>
+          <a:off x="0" y="0"/>
+          <a:ext cx="0" cy="0"/>
+          <a:chOff x="0" y="0"/>
+          <a:chExt cx="0" cy="0"/>
+        </a:xfrm>
+      </p:grpSpPr>
+      <p:sp>
+        <p:nvSpPr>
+          <p:cNvPr id="6" name="TextBox 5">
+            <a:extLst>
+              <a:ext uri="{FF2B5EF4-FFF2-40B4-BE49-F238E27FC236}">
+                <a16:creationId xmlns:a16="http://schemas.microsoft.com/office/drawing/2014/main" id="{2058FC27-7406-C29B-1CB5-C1E6513335A0}"/>
+              </a:ext>
+            </a:extLst>
+          </p:cNvPr>
+          <p:cNvSpPr txBox="1"/>
+          <p:nvPr/>
+        </p:nvSpPr>
+        <p:spPr>
+          <a:xfrm>
+            <a:off x="235670" y="75414"/>
+            <a:ext cx="7339702" cy="461665"/>
+          </a:xfrm>
+          <a:prstGeom prst="rect">
+            <a:avLst/>
+          </a:prstGeom>
+          <a:noFill/>
+        </p:spPr>
+        <p:txBody>
+          <a:bodyPr wrap="none" rtlCol="0">
+            <a:spAutoFit/>
+          </a:bodyPr>
+          <a:lstStyle/>
+          <a:p>
+            <a:r>
+              <a:rPr lang="en-GB" sz="2400" dirty="0">
+                <a:solidFill>
+                  <a:schemeClr val="bg1"/>
+                </a:solidFill>
+                <a:latin typeface="Arial Black" panose="020B0A04020102020204" pitchFamily="34" charset="0"/>
+              </a:rPr>
+              <a:t>3.1. Exploration et </a:t>
+            </a:r>
+            <a:r>
+              <a:rPr lang="en-GB" sz="2400" dirty="0" err="1">
+                <a:solidFill>
+                  <a:schemeClr val="bg1"/>
+                </a:solidFill>
+                <a:latin typeface="Arial Black" panose="020B0A04020102020204" pitchFamily="34" charset="0"/>
+              </a:rPr>
+              <a:t>Nettoyage</a:t>
+            </a:r>
+            <a:r>
+              <a:rPr lang="en-GB" sz="2400" dirty="0">
+                <a:solidFill>
+                  <a:schemeClr val="bg1"/>
+                </a:solidFill>
+                <a:latin typeface="Arial Black" panose="020B0A04020102020204" pitchFamily="34" charset="0"/>
+              </a:rPr>
+              <a:t> des données</a:t>
+            </a:r>
+          </a:p>
+        </p:txBody>
+      </p:sp>
+      <p:sp>
+        <p:nvSpPr>
+          <p:cNvPr id="4" name="TextBox 3">
+            <a:extLst>
+              <a:ext uri="{FF2B5EF4-FFF2-40B4-BE49-F238E27FC236}">
+                <a16:creationId xmlns:a16="http://schemas.microsoft.com/office/drawing/2014/main" id="{388F4FC3-4781-BA23-2EDE-C1FE0F436EA3}"/>
+              </a:ext>
+            </a:extLst>
+          </p:cNvPr>
+          <p:cNvSpPr txBox="1"/>
+          <p:nvPr/>
+        </p:nvSpPr>
+        <p:spPr>
+          <a:xfrm>
+            <a:off x="7409470" y="868452"/>
+            <a:ext cx="4446309" cy="2031325"/>
+          </a:xfrm>
+          <a:prstGeom prst="rect">
+            <a:avLst/>
+          </a:prstGeom>
+          <a:noFill/>
+        </p:spPr>
+        <p:txBody>
+          <a:bodyPr wrap="square" rtlCol="0">
+            <a:spAutoFit/>
+          </a:bodyPr>
+          <a:lstStyle/>
+          <a:p>
+            <a:r>
+              <a:rPr lang="en-GB" dirty="0"/>
+              <a:t>Forte </a:t>
+            </a:r>
+            <a:r>
+              <a:rPr lang="en-GB" dirty="0" err="1"/>
+              <a:t>corrélation</a:t>
+            </a:r>
+            <a:r>
+              <a:rPr lang="en-GB" dirty="0"/>
+              <a:t> entre variables </a:t>
+            </a:r>
+            <a:r>
+              <a:rPr lang="en-GB" dirty="0" err="1"/>
+              <a:t>explicatives</a:t>
+            </a:r>
+            <a:r>
+              <a:rPr lang="en-GB" dirty="0"/>
+              <a:t> et target</a:t>
+            </a:r>
+          </a:p>
+          <a:p>
+            <a:pPr marL="285750" indent="-285750">
+              <a:buFont typeface="Wingdings" panose="05000000000000000000" pitchFamily="2" charset="2"/>
+              <a:buChar char="à"/>
+            </a:pPr>
+            <a:r>
+              <a:rPr lang="en-GB" dirty="0" err="1">
+                <a:sym typeface="Wingdings" panose="05000000000000000000" pitchFamily="2" charset="2"/>
+              </a:rPr>
+              <a:t>Modèle</a:t>
+            </a:r>
+            <a:r>
+              <a:rPr lang="en-GB" dirty="0">
+                <a:sym typeface="Wingdings" panose="05000000000000000000" pitchFamily="2" charset="2"/>
+              </a:rPr>
+              <a:t> de regression </a:t>
+            </a:r>
+            <a:r>
+              <a:rPr lang="en-GB" dirty="0" err="1">
+                <a:sym typeface="Wingdings" panose="05000000000000000000" pitchFamily="2" charset="2"/>
+              </a:rPr>
+              <a:t>linéaire</a:t>
+            </a:r>
+            <a:r>
+              <a:rPr lang="en-GB" dirty="0">
+                <a:sym typeface="Wingdings" panose="05000000000000000000" pitchFamily="2" charset="2"/>
+              </a:rPr>
+              <a:t> </a:t>
+            </a:r>
+            <a:r>
+              <a:rPr lang="en-GB" dirty="0" err="1">
+                <a:sym typeface="Wingdings" panose="05000000000000000000" pitchFamily="2" charset="2"/>
+              </a:rPr>
+              <a:t>approprié</a:t>
+            </a:r>
+            <a:endParaRPr lang="en-GB" dirty="0">
+              <a:sym typeface="Wingdings" panose="05000000000000000000" pitchFamily="2" charset="2"/>
+            </a:endParaRPr>
+          </a:p>
+          <a:p>
+            <a:pPr marL="285750" indent="-285750">
+              <a:buFont typeface="Wingdings" panose="05000000000000000000" pitchFamily="2" charset="2"/>
+              <a:buChar char="à"/>
+            </a:pPr>
+            <a:endParaRPr lang="en-GB" dirty="0">
+              <a:sym typeface="Wingdings" panose="05000000000000000000" pitchFamily="2" charset="2"/>
+            </a:endParaRPr>
+          </a:p>
+          <a:p>
+            <a:r>
+              <a:rPr lang="en-GB" dirty="0">
+                <a:sym typeface="Wingdings" panose="05000000000000000000" pitchFamily="2" charset="2"/>
+              </a:rPr>
+              <a:t>Range de </a:t>
+            </a:r>
+            <a:r>
+              <a:rPr lang="en-GB" dirty="0" err="1">
+                <a:sym typeface="Wingdings" panose="05000000000000000000" pitchFamily="2" charset="2"/>
+              </a:rPr>
+              <a:t>valeurs</a:t>
+            </a:r>
+            <a:r>
+              <a:rPr lang="en-GB" dirty="0">
+                <a:sym typeface="Wingdings" panose="05000000000000000000" pitchFamily="2" charset="2"/>
+              </a:rPr>
+              <a:t> très </a:t>
+            </a:r>
+            <a:r>
+              <a:rPr lang="en-GB" dirty="0" err="1">
+                <a:sym typeface="Wingdings" panose="05000000000000000000" pitchFamily="2" charset="2"/>
+              </a:rPr>
+              <a:t>différentes</a:t>
+            </a:r>
+            <a:endParaRPr lang="en-GB" dirty="0">
+              <a:sym typeface="Wingdings" panose="05000000000000000000" pitchFamily="2" charset="2"/>
+            </a:endParaRPr>
+          </a:p>
+          <a:p>
+            <a:r>
+              <a:rPr lang="en-GB" dirty="0">
+                <a:sym typeface="Wingdings" panose="05000000000000000000" pitchFamily="2" charset="2"/>
+              </a:rPr>
+              <a:t> Normalisation </a:t>
+            </a:r>
+            <a:r>
+              <a:rPr lang="en-GB" dirty="0" err="1">
+                <a:sym typeface="Wingdings" panose="05000000000000000000" pitchFamily="2" charset="2"/>
+              </a:rPr>
+              <a:t>devrait</a:t>
+            </a:r>
+            <a:r>
+              <a:rPr lang="en-GB" dirty="0">
+                <a:sym typeface="Wingdings" panose="05000000000000000000" pitchFamily="2" charset="2"/>
+              </a:rPr>
+              <a:t> </a:t>
+            </a:r>
+            <a:r>
+              <a:rPr lang="en-GB" dirty="0" err="1">
+                <a:sym typeface="Wingdings" panose="05000000000000000000" pitchFamily="2" charset="2"/>
+              </a:rPr>
+              <a:t>apporter</a:t>
+            </a:r>
+            <a:r>
+              <a:rPr lang="en-GB" dirty="0">
+                <a:sym typeface="Wingdings" panose="05000000000000000000" pitchFamily="2" charset="2"/>
+              </a:rPr>
+              <a:t> de bons </a:t>
+            </a:r>
+            <a:r>
+              <a:rPr lang="en-GB" dirty="0" err="1">
+                <a:sym typeface="Wingdings" panose="05000000000000000000" pitchFamily="2" charset="2"/>
+              </a:rPr>
+              <a:t>résultats</a:t>
+            </a:r>
+            <a:endParaRPr lang="en-GB" dirty="0"/>
+          </a:p>
+        </p:txBody>
+      </p:sp>
+      <p:grpSp>
+        <p:nvGrpSpPr>
+          <p:cNvPr id="10" name="Group 9">
+            <a:extLst>
+              <a:ext uri="{FF2B5EF4-FFF2-40B4-BE49-F238E27FC236}">
+                <a16:creationId xmlns:a16="http://schemas.microsoft.com/office/drawing/2014/main" id="{8BA61D6F-7E8F-A4C6-22DF-798AD1FEB376}"/>
+              </a:ext>
+            </a:extLst>
+          </p:cNvPr>
+          <p:cNvGrpSpPr/>
+          <p:nvPr/>
+        </p:nvGrpSpPr>
+        <p:grpSpPr>
+          <a:xfrm>
+            <a:off x="336221" y="868452"/>
+            <a:ext cx="5401999" cy="4527110"/>
+            <a:chOff x="336221" y="868452"/>
+            <a:chExt cx="5401999" cy="4527110"/>
+          </a:xfrm>
+        </p:grpSpPr>
+        <p:pic>
+          <p:nvPicPr>
+            <p:cNvPr id="3" name="Picture 2">
+              <a:extLst>
+                <a:ext uri="{FF2B5EF4-FFF2-40B4-BE49-F238E27FC236}">
+                  <a16:creationId xmlns:a16="http://schemas.microsoft.com/office/drawing/2014/main" id="{200226BC-455B-9C19-90A6-534A6DCC4441}"/>
+                </a:ext>
+              </a:extLst>
+            </p:cNvPr>
+            <p:cNvPicPr>
+              <a:picLocks noChangeAspect="1"/>
+            </p:cNvPicPr>
+            <p:nvPr/>
+          </p:nvPicPr>
+          <p:blipFill>
+            <a:blip r:embed="rId2"/>
+            <a:stretch>
+              <a:fillRect/>
+            </a:stretch>
+          </p:blipFill>
+          <p:spPr>
+            <a:xfrm>
+              <a:off x="336221" y="868452"/>
+              <a:ext cx="5401999" cy="4527110"/>
+            </a:xfrm>
+            <a:prstGeom prst="rect">
+              <a:avLst/>
+            </a:prstGeom>
+          </p:spPr>
+        </p:pic>
+        <p:sp>
+          <p:nvSpPr>
+            <p:cNvPr id="5" name="Rectangle 4">
+              <a:extLst>
+                <a:ext uri="{FF2B5EF4-FFF2-40B4-BE49-F238E27FC236}">
+                  <a16:creationId xmlns:a16="http://schemas.microsoft.com/office/drawing/2014/main" id="{C90D2EDA-E89B-680D-F2DD-A970CDE1C92E}"/>
+                </a:ext>
+              </a:extLst>
+            </p:cNvPr>
+            <p:cNvSpPr/>
+            <p:nvPr/>
+          </p:nvSpPr>
+          <p:spPr>
+            <a:xfrm>
+              <a:off x="1095298" y="3216897"/>
+              <a:ext cx="3883843" cy="410224"/>
+            </a:xfrm>
+            <a:prstGeom prst="rect">
+              <a:avLst/>
+            </a:prstGeom>
+            <a:noFill/>
+            <a:ln w="28575">
+              <a:solidFill>
+                <a:schemeClr val="tx1"/>
+              </a:solidFill>
+            </a:ln>
+          </p:spPr>
+          <p:style>
+            <a:lnRef idx="2">
+              <a:schemeClr val="accent1">
+                <a:shade val="15000"/>
+              </a:schemeClr>
+            </a:lnRef>
+            <a:fillRef idx="1">
+              <a:schemeClr val="accent1"/>
+            </a:fillRef>
+            <a:effectRef idx="0">
+              <a:schemeClr val="accent1"/>
+            </a:effectRef>
+            <a:fontRef idx="minor">
+              <a:schemeClr val="lt1"/>
+            </a:fontRef>
+          </p:style>
+          <p:txBody>
+            <a:bodyPr rtlCol="0" anchor="ctr"/>
+            <a:lstStyle/>
+            <a:p>
+              <a:pPr algn="ctr"/>
+              <a:endParaRPr lang="en-GB"/>
+            </a:p>
+          </p:txBody>
+        </p:sp>
+      </p:grpSp>
+      <p:pic>
+        <p:nvPicPr>
+          <p:cNvPr id="9" name="Picture 8">
+            <a:extLst>
+              <a:ext uri="{FF2B5EF4-FFF2-40B4-BE49-F238E27FC236}">
+                <a16:creationId xmlns:a16="http://schemas.microsoft.com/office/drawing/2014/main" id="{F310C39A-702E-A283-21C8-2D9AFFF144C0}"/>
+              </a:ext>
+            </a:extLst>
+          </p:cNvPr>
+          <p:cNvPicPr>
+            <a:picLocks noChangeAspect="1"/>
+          </p:cNvPicPr>
+          <p:nvPr/>
+        </p:nvPicPr>
+        <p:blipFill>
+          <a:blip r:embed="rId3"/>
+          <a:stretch>
+            <a:fillRect/>
+          </a:stretch>
+        </p:blipFill>
+        <p:spPr>
+          <a:xfrm>
+            <a:off x="336223" y="5140312"/>
+            <a:ext cx="6881567" cy="1137858"/>
+          </a:xfrm>
+          <a:prstGeom prst="rect">
+            <a:avLst/>
+          </a:prstGeom>
+        </p:spPr>
+      </p:pic>
+      <p:pic>
+        <p:nvPicPr>
+          <p:cNvPr id="12" name="Picture 11">
+            <a:extLst>
+              <a:ext uri="{FF2B5EF4-FFF2-40B4-BE49-F238E27FC236}">
+                <a16:creationId xmlns:a16="http://schemas.microsoft.com/office/drawing/2014/main" id="{7085E019-6255-C619-13F9-6C7498BC555E}"/>
+              </a:ext>
+            </a:extLst>
+          </p:cNvPr>
+          <p:cNvPicPr>
+            <a:picLocks noChangeAspect="1"/>
+          </p:cNvPicPr>
+          <p:nvPr/>
+        </p:nvPicPr>
+        <p:blipFill>
+          <a:blip r:embed="rId4"/>
+          <a:stretch>
+            <a:fillRect/>
+          </a:stretch>
+        </p:blipFill>
+        <p:spPr>
+          <a:xfrm>
+            <a:off x="8180599" y="3047291"/>
+            <a:ext cx="3635805" cy="3230879"/>
+          </a:xfrm>
+          <a:prstGeom prst="rect">
+            <a:avLst/>
+          </a:prstGeom>
+        </p:spPr>
+      </p:pic>
+      <p:sp>
+        <p:nvSpPr>
+          <p:cNvPr id="13" name="TextBox 12">
+            <a:extLst>
+              <a:ext uri="{FF2B5EF4-FFF2-40B4-BE49-F238E27FC236}">
+                <a16:creationId xmlns:a16="http://schemas.microsoft.com/office/drawing/2014/main" id="{68201117-CB8A-D842-4F48-B8C79C037E37}"/>
+              </a:ext>
+            </a:extLst>
+          </p:cNvPr>
+          <p:cNvSpPr txBox="1"/>
+          <p:nvPr/>
+        </p:nvSpPr>
+        <p:spPr>
+          <a:xfrm>
+            <a:off x="11756566" y="6370320"/>
+            <a:ext cx="301686" cy="369332"/>
+          </a:xfrm>
+          <a:prstGeom prst="rect">
+            <a:avLst/>
+          </a:prstGeom>
+          <a:noFill/>
+        </p:spPr>
+        <p:txBody>
+          <a:bodyPr wrap="none" rtlCol="0">
+            <a:spAutoFit/>
+          </a:bodyPr>
+          <a:lstStyle/>
+          <a:p>
+            <a:r>
+              <a:rPr lang="en-GB" dirty="0">
+                <a:solidFill>
+                  <a:schemeClr val="bg1"/>
+                </a:solidFill>
+              </a:rPr>
+              <a:t>5</a:t>
+            </a:r>
+          </a:p>
+        </p:txBody>
+      </p:sp>
+    </p:spTree>
+    <p:extLst>
+      <p:ext uri="{BB962C8B-B14F-4D97-AF65-F5344CB8AC3E}">
+        <p14:creationId xmlns:p14="http://schemas.microsoft.com/office/powerpoint/2010/main" val="3030837421"/>
+      </p:ext>
+    </p:extLst>
+  </p:cSld>
+  <p:clrMapOvr>
+    <a:masterClrMapping/>
+  </p:clrMapOvr>
+</p:sld>
+</file>
+
+<file path=ppt/slides/slide7.xml><?xml version="1.0" encoding="utf-8"?>
+<p:sld xmlns:a="http://schemas.openxmlformats.org/drawingml/2006/main" xmlns:r="http://schemas.openxmlformats.org/officeDocument/2006/relationships" xmlns:p="http://schemas.openxmlformats.org/presentationml/2006/main">
+  <p:cSld>
+    <p:spTree>
+      <p:nvGrpSpPr>
+        <p:cNvPr id="1" name="">
+          <a:extLst>
+            <a:ext uri="{FF2B5EF4-FFF2-40B4-BE49-F238E27FC236}">
+              <a16:creationId xmlns:a16="http://schemas.microsoft.com/office/drawing/2014/main" id="{F7C98910-7D80-0B18-6247-6194659922D4}"/>
+            </a:ext>
+          </a:extLst>
+        </p:cNvPr>
+        <p:cNvGrpSpPr/>
+        <p:nvPr/>
+      </p:nvGrpSpPr>
+      <p:grpSpPr>
+        <a:xfrm>
+          <a:off x="0" y="0"/>
+          <a:ext cx="0" cy="0"/>
+          <a:chOff x="0" y="0"/>
+          <a:chExt cx="0" cy="0"/>
+        </a:xfrm>
+      </p:grpSpPr>
+      <p:sp>
+        <p:nvSpPr>
+          <p:cNvPr id="6" name="TextBox 5">
+            <a:extLst>
+              <a:ext uri="{FF2B5EF4-FFF2-40B4-BE49-F238E27FC236}">
+                <a16:creationId xmlns:a16="http://schemas.microsoft.com/office/drawing/2014/main" id="{4032C138-23EB-6430-6276-D0A925C7CA3B}"/>
+              </a:ext>
+            </a:extLst>
+          </p:cNvPr>
+          <p:cNvSpPr txBox="1"/>
+          <p:nvPr/>
+        </p:nvSpPr>
+        <p:spPr>
+          <a:xfrm>
+            <a:off x="235670" y="75414"/>
+            <a:ext cx="4723922" cy="461665"/>
+          </a:xfrm>
+          <a:prstGeom prst="rect">
+            <a:avLst/>
+          </a:prstGeom>
+          <a:noFill/>
+        </p:spPr>
+        <p:txBody>
+          <a:bodyPr wrap="none" rtlCol="0">
+            <a:spAutoFit/>
+          </a:bodyPr>
+          <a:lstStyle/>
+          <a:p>
+            <a:r>
+              <a:rPr lang="en-GB" sz="2400" dirty="0">
+                <a:solidFill>
+                  <a:schemeClr val="bg1"/>
+                </a:solidFill>
+                <a:latin typeface="Arial Black" panose="020B0A04020102020204" pitchFamily="34" charset="0"/>
+              </a:rPr>
+              <a:t>3.2. </a:t>
+            </a:r>
+            <a:r>
+              <a:rPr lang="en-GB" sz="2400" dirty="0" err="1">
+                <a:solidFill>
+                  <a:schemeClr val="bg1"/>
+                </a:solidFill>
+                <a:latin typeface="Arial Black" panose="020B0A04020102020204" pitchFamily="34" charset="0"/>
+              </a:rPr>
+              <a:t>Résultats</a:t>
+            </a:r>
+            <a:r>
+              <a:rPr lang="en-GB" sz="2400" dirty="0">
+                <a:solidFill>
+                  <a:schemeClr val="bg1"/>
+                </a:solidFill>
+                <a:latin typeface="Arial Black" panose="020B0A04020102020204" pitchFamily="34" charset="0"/>
+              </a:rPr>
+              <a:t> des </a:t>
+            </a:r>
+            <a:r>
+              <a:rPr lang="en-GB" sz="2400" dirty="0" err="1">
+                <a:solidFill>
+                  <a:schemeClr val="bg1"/>
+                </a:solidFill>
+                <a:latin typeface="Arial Black" panose="020B0A04020102020204" pitchFamily="34" charset="0"/>
+              </a:rPr>
+              <a:t>modèles</a:t>
+            </a:r>
+            <a:endParaRPr lang="en-GB" sz="2400" dirty="0">
+              <a:solidFill>
+                <a:schemeClr val="bg1"/>
+              </a:solidFill>
+              <a:latin typeface="Arial Black" panose="020B0A04020102020204" pitchFamily="34" charset="0"/>
+            </a:endParaRPr>
+          </a:p>
+        </p:txBody>
+      </p:sp>
+      <p:pic>
+        <p:nvPicPr>
+          <p:cNvPr id="7" name="Picture 6">
+            <a:extLst>
+              <a:ext uri="{FF2B5EF4-FFF2-40B4-BE49-F238E27FC236}">
+                <a16:creationId xmlns:a16="http://schemas.microsoft.com/office/drawing/2014/main" id="{665AB17D-5944-21BB-8F0E-BFAF1290816D}"/>
+              </a:ext>
+            </a:extLst>
+          </p:cNvPr>
+          <p:cNvPicPr>
+            <a:picLocks noChangeAspect="1"/>
+          </p:cNvPicPr>
+          <p:nvPr/>
+        </p:nvPicPr>
+        <p:blipFill>
+          <a:blip r:embed="rId2"/>
+          <a:stretch>
+            <a:fillRect/>
+          </a:stretch>
+        </p:blipFill>
+        <p:spPr>
+          <a:xfrm>
+            <a:off x="0" y="648836"/>
+            <a:ext cx="7833360" cy="1933340"/>
+          </a:xfrm>
+          <a:prstGeom prst="rect">
+            <a:avLst/>
+          </a:prstGeom>
+        </p:spPr>
+      </p:pic>
+      <p:pic>
+        <p:nvPicPr>
+          <p:cNvPr id="11" name="Picture 10">
+            <a:extLst>
+              <a:ext uri="{FF2B5EF4-FFF2-40B4-BE49-F238E27FC236}">
+                <a16:creationId xmlns:a16="http://schemas.microsoft.com/office/drawing/2014/main" id="{32D2FF22-3815-5598-329E-ECAF05BB1CFB}"/>
+              </a:ext>
+            </a:extLst>
+          </p:cNvPr>
+          <p:cNvPicPr>
+            <a:picLocks noChangeAspect="1"/>
+          </p:cNvPicPr>
+          <p:nvPr/>
+        </p:nvPicPr>
+        <p:blipFill>
+          <a:blip r:embed="rId3"/>
+          <a:stretch>
+            <a:fillRect/>
+          </a:stretch>
+        </p:blipFill>
+        <p:spPr>
+          <a:xfrm>
+            <a:off x="0" y="2785383"/>
+            <a:ext cx="7833360" cy="1986316"/>
+          </a:xfrm>
+          <a:prstGeom prst="rect">
+            <a:avLst/>
+          </a:prstGeom>
+        </p:spPr>
+      </p:pic>
+      <p:pic>
+        <p:nvPicPr>
+          <p:cNvPr id="13" name="Picture 12">
+            <a:extLst>
+              <a:ext uri="{FF2B5EF4-FFF2-40B4-BE49-F238E27FC236}">
+                <a16:creationId xmlns:a16="http://schemas.microsoft.com/office/drawing/2014/main" id="{41FD6769-AE6F-66FF-289E-7F9FD01694A3}"/>
+              </a:ext>
+            </a:extLst>
+          </p:cNvPr>
+          <p:cNvPicPr>
+            <a:picLocks noChangeAspect="1"/>
+          </p:cNvPicPr>
+          <p:nvPr/>
+        </p:nvPicPr>
+        <p:blipFill>
+          <a:blip r:embed="rId4"/>
+          <a:stretch>
+            <a:fillRect/>
+          </a:stretch>
+        </p:blipFill>
+        <p:spPr>
+          <a:xfrm>
+            <a:off x="0" y="4913628"/>
+            <a:ext cx="7833360" cy="1944372"/>
+          </a:xfrm>
+          <a:prstGeom prst="rect">
+            <a:avLst/>
+          </a:prstGeom>
+        </p:spPr>
+      </p:pic>
+      <p:pic>
+        <p:nvPicPr>
+          <p:cNvPr id="19" name="Picture 18">
+            <a:extLst>
+              <a:ext uri="{FF2B5EF4-FFF2-40B4-BE49-F238E27FC236}">
+                <a16:creationId xmlns:a16="http://schemas.microsoft.com/office/drawing/2014/main" id="{B8B3AB2D-FE73-F324-4683-6956DCAA0D08}"/>
+              </a:ext>
+            </a:extLst>
+          </p:cNvPr>
+          <p:cNvPicPr>
+            <a:picLocks noChangeAspect="1"/>
+          </p:cNvPicPr>
+          <p:nvPr/>
+        </p:nvPicPr>
+        <p:blipFill>
+          <a:blip r:embed="rId5"/>
+          <a:stretch>
+            <a:fillRect/>
+          </a:stretch>
+        </p:blipFill>
+        <p:spPr>
+          <a:xfrm>
+            <a:off x="7833360" y="4000066"/>
+            <a:ext cx="4358640" cy="724949"/>
+          </a:xfrm>
+          <a:prstGeom prst="rect">
+            <a:avLst/>
+          </a:prstGeom>
+        </p:spPr>
+      </p:pic>
+      <p:pic>
+        <p:nvPicPr>
+          <p:cNvPr id="21" name="Picture 20">
+            <a:extLst>
+              <a:ext uri="{FF2B5EF4-FFF2-40B4-BE49-F238E27FC236}">
+                <a16:creationId xmlns:a16="http://schemas.microsoft.com/office/drawing/2014/main" id="{721D3F17-6BDC-7B01-910E-84D615F48A4B}"/>
+              </a:ext>
+            </a:extLst>
+          </p:cNvPr>
+          <p:cNvPicPr>
+            <a:picLocks noChangeAspect="1"/>
+          </p:cNvPicPr>
+          <p:nvPr/>
+        </p:nvPicPr>
+        <p:blipFill>
+          <a:blip r:embed="rId6"/>
+          <a:stretch>
+            <a:fillRect/>
+          </a:stretch>
+        </p:blipFill>
+        <p:spPr>
+          <a:xfrm>
+            <a:off x="7833361" y="1871822"/>
+            <a:ext cx="4358640" cy="729442"/>
+          </a:xfrm>
+          <a:prstGeom prst="rect">
+            <a:avLst/>
+          </a:prstGeom>
+        </p:spPr>
+      </p:pic>
+      <p:pic>
+        <p:nvPicPr>
+          <p:cNvPr id="23" name="Picture 22">
+            <a:extLst>
+              <a:ext uri="{FF2B5EF4-FFF2-40B4-BE49-F238E27FC236}">
+                <a16:creationId xmlns:a16="http://schemas.microsoft.com/office/drawing/2014/main" id="{1BA1F1B1-7AB2-A771-FD43-50CB8A46F5E3}"/>
+              </a:ext>
+            </a:extLst>
+          </p:cNvPr>
+          <p:cNvPicPr>
+            <a:picLocks noChangeAspect="1"/>
+          </p:cNvPicPr>
+          <p:nvPr/>
+        </p:nvPicPr>
+        <p:blipFill>
+          <a:blip r:embed="rId7"/>
+          <a:stretch>
+            <a:fillRect/>
+          </a:stretch>
+        </p:blipFill>
+        <p:spPr>
+          <a:xfrm>
+            <a:off x="7833360" y="6055878"/>
+            <a:ext cx="4358640" cy="796548"/>
+          </a:xfrm>
+          <a:prstGeom prst="rect">
+            <a:avLst/>
+          </a:prstGeom>
+        </p:spPr>
+      </p:pic>
+      <p:sp>
+        <p:nvSpPr>
+          <p:cNvPr id="24" name="TextBox 23">
+            <a:extLst>
+              <a:ext uri="{FF2B5EF4-FFF2-40B4-BE49-F238E27FC236}">
+                <a16:creationId xmlns:a16="http://schemas.microsoft.com/office/drawing/2014/main" id="{D093C68B-7F04-09B1-F227-726EEA5C3553}"/>
+              </a:ext>
+            </a:extLst>
+          </p:cNvPr>
+          <p:cNvSpPr txBox="1"/>
+          <p:nvPr/>
+        </p:nvSpPr>
+        <p:spPr>
+          <a:xfrm>
+            <a:off x="8549640" y="960120"/>
+            <a:ext cx="2742546" cy="369332"/>
+          </a:xfrm>
+          <a:prstGeom prst="rect">
+            <a:avLst/>
+          </a:prstGeom>
+          <a:noFill/>
+        </p:spPr>
+        <p:txBody>
+          <a:bodyPr wrap="none" rtlCol="0">
+            <a:spAutoFit/>
+          </a:bodyPr>
+          <a:lstStyle/>
+          <a:p>
+            <a:r>
+              <a:rPr lang="en-GB" b="1" dirty="0" err="1"/>
+              <a:t>Régression</a:t>
+            </a:r>
+            <a:r>
+              <a:rPr lang="en-GB" b="1" dirty="0"/>
+              <a:t> </a:t>
+            </a:r>
+            <a:r>
+              <a:rPr lang="en-GB" b="1" dirty="0" err="1"/>
+              <a:t>linéaire</a:t>
+            </a:r>
+            <a:r>
+              <a:rPr lang="en-GB" b="1" dirty="0"/>
+              <a:t> SIMPLE</a:t>
+            </a:r>
+          </a:p>
+        </p:txBody>
+      </p:sp>
+      <p:sp>
+        <p:nvSpPr>
+          <p:cNvPr id="25" name="TextBox 24">
+            <a:extLst>
+              <a:ext uri="{FF2B5EF4-FFF2-40B4-BE49-F238E27FC236}">
+                <a16:creationId xmlns:a16="http://schemas.microsoft.com/office/drawing/2014/main" id="{B6A4E6DD-7ACF-D92B-A841-32D06D1A5C7A}"/>
+              </a:ext>
+            </a:extLst>
+          </p:cNvPr>
+          <p:cNvSpPr txBox="1"/>
+          <p:nvPr/>
+        </p:nvSpPr>
+        <p:spPr>
+          <a:xfrm>
+            <a:off x="8549640" y="3059668"/>
+            <a:ext cx="3094245" cy="369332"/>
+          </a:xfrm>
+          <a:prstGeom prst="rect">
+            <a:avLst/>
+          </a:prstGeom>
+          <a:noFill/>
+        </p:spPr>
+        <p:txBody>
+          <a:bodyPr wrap="none" rtlCol="0">
+            <a:spAutoFit/>
+          </a:bodyPr>
+          <a:lstStyle/>
+          <a:p>
+            <a:r>
+              <a:rPr lang="en-GB" b="1" dirty="0" err="1"/>
+              <a:t>Régression</a:t>
+            </a:r>
+            <a:r>
+              <a:rPr lang="en-GB" b="1" dirty="0"/>
+              <a:t> </a:t>
+            </a:r>
+            <a:r>
+              <a:rPr lang="en-GB" b="1" dirty="0" err="1"/>
+              <a:t>linéaire</a:t>
+            </a:r>
+            <a:r>
+              <a:rPr lang="en-GB" b="1" dirty="0"/>
+              <a:t> </a:t>
+            </a:r>
+            <a:r>
+              <a:rPr lang="en-GB" b="1" dirty="0" err="1"/>
+              <a:t>régularisée</a:t>
+            </a:r>
+            <a:endParaRPr lang="en-GB" b="1" dirty="0"/>
+          </a:p>
+        </p:txBody>
+      </p:sp>
+      <p:sp>
+        <p:nvSpPr>
+          <p:cNvPr id="26" name="TextBox 25">
+            <a:extLst>
+              <a:ext uri="{FF2B5EF4-FFF2-40B4-BE49-F238E27FC236}">
+                <a16:creationId xmlns:a16="http://schemas.microsoft.com/office/drawing/2014/main" id="{E82D9502-7851-2D7A-F8BA-F6E672ADB361}"/>
+              </a:ext>
+            </a:extLst>
+          </p:cNvPr>
+          <p:cNvSpPr txBox="1"/>
+          <p:nvPr/>
+        </p:nvSpPr>
+        <p:spPr>
+          <a:xfrm>
+            <a:off x="8549640" y="5296081"/>
+            <a:ext cx="2947730" cy="369332"/>
+          </a:xfrm>
+          <a:prstGeom prst="rect">
+            <a:avLst/>
+          </a:prstGeom>
+          <a:noFill/>
+        </p:spPr>
+        <p:txBody>
+          <a:bodyPr wrap="none" rtlCol="0">
+            <a:spAutoFit/>
+          </a:bodyPr>
+          <a:lstStyle/>
+          <a:p>
+            <a:r>
+              <a:rPr lang="en-GB" b="1" dirty="0" err="1"/>
+              <a:t>Régression</a:t>
+            </a:r>
+            <a:r>
+              <a:rPr lang="en-GB" b="1" dirty="0"/>
+              <a:t> </a:t>
+            </a:r>
+            <a:r>
+              <a:rPr lang="en-GB" b="1" dirty="0" err="1"/>
+              <a:t>linéaire</a:t>
+            </a:r>
+            <a:r>
+              <a:rPr lang="en-GB" b="1" dirty="0"/>
+              <a:t> </a:t>
+            </a:r>
+            <a:r>
+              <a:rPr lang="en-GB" b="1" dirty="0" err="1"/>
+              <a:t>pénalisée</a:t>
+            </a:r>
+            <a:endParaRPr lang="en-GB" b="1" dirty="0"/>
+          </a:p>
+        </p:txBody>
+      </p:sp>
+    </p:spTree>
+    <p:extLst>
+      <p:ext uri="{BB962C8B-B14F-4D97-AF65-F5344CB8AC3E}">
+        <p14:creationId xmlns:p14="http://schemas.microsoft.com/office/powerpoint/2010/main" val="2802560313"/>
+      </p:ext>
+    </p:extLst>
+  </p:cSld>
+  <p:clrMapOvr>
+    <a:masterClrMapping/>
+  </p:clrMapOvr>
+</p:sld>
+</file>
+
+<file path=ppt/slides/slide8.xml><?xml version="1.0" encoding="utf-8"?>
+<p:sld xmlns:a="http://schemas.openxmlformats.org/drawingml/2006/main" xmlns:r="http://schemas.openxmlformats.org/officeDocument/2006/relationships" xmlns:p="http://schemas.openxmlformats.org/presentationml/2006/main">
+  <p:cSld>
+    <p:spTree>
+      <p:nvGrpSpPr>
+        <p:cNvPr id="1" name="">
+          <a:extLst>
+            <a:ext uri="{FF2B5EF4-FFF2-40B4-BE49-F238E27FC236}">
+              <a16:creationId xmlns:a16="http://schemas.microsoft.com/office/drawing/2014/main" id="{5E7D340D-46E9-7803-90D0-61144850E5FB}"/>
+            </a:ext>
+          </a:extLst>
+        </p:cNvPr>
+        <p:cNvGrpSpPr/>
+        <p:nvPr/>
+      </p:nvGrpSpPr>
+      <p:grpSpPr>
+        <a:xfrm>
+          <a:off x="0" y="0"/>
+          <a:ext cx="0" cy="0"/>
+          <a:chOff x="0" y="0"/>
+          <a:chExt cx="0" cy="0"/>
+        </a:xfrm>
+      </p:grpSpPr>
+      <p:sp>
+        <p:nvSpPr>
+          <p:cNvPr id="6" name="TextBox 5">
+            <a:extLst>
+              <a:ext uri="{FF2B5EF4-FFF2-40B4-BE49-F238E27FC236}">
+                <a16:creationId xmlns:a16="http://schemas.microsoft.com/office/drawing/2014/main" id="{975653BD-6EE8-3F78-AAA1-C26F1F4F8D82}"/>
+              </a:ext>
+            </a:extLst>
+          </p:cNvPr>
+          <p:cNvSpPr txBox="1"/>
+          <p:nvPr/>
+        </p:nvSpPr>
+        <p:spPr>
+          <a:xfrm>
+            <a:off x="235670" y="75414"/>
+            <a:ext cx="2757550" cy="461665"/>
+          </a:xfrm>
+          <a:prstGeom prst="rect">
+            <a:avLst/>
+          </a:prstGeom>
+          <a:noFill/>
+        </p:spPr>
+        <p:txBody>
+          <a:bodyPr wrap="none" rtlCol="0">
+            <a:spAutoFit/>
+          </a:bodyPr>
+          <a:lstStyle/>
+          <a:p>
+            <a:r>
+              <a:rPr lang="en-GB" sz="2400" dirty="0">
+                <a:solidFill>
+                  <a:schemeClr val="bg1"/>
+                </a:solidFill>
+                <a:latin typeface="Arial Black" panose="020B0A04020102020204" pitchFamily="34" charset="0"/>
+              </a:rPr>
+              <a:t>3.3. Conclusion</a:t>
+            </a:r>
+          </a:p>
+        </p:txBody>
+      </p:sp>
+      <p:pic>
+        <p:nvPicPr>
+          <p:cNvPr id="3" name="Picture 2">
+            <a:extLst>
+              <a:ext uri="{FF2B5EF4-FFF2-40B4-BE49-F238E27FC236}">
+                <a16:creationId xmlns:a16="http://schemas.microsoft.com/office/drawing/2014/main" id="{29E05B70-D818-0280-9C5E-95AC85A65D73}"/>
+              </a:ext>
+            </a:extLst>
+          </p:cNvPr>
+          <p:cNvPicPr>
+            <a:picLocks noChangeAspect="1"/>
+          </p:cNvPicPr>
+          <p:nvPr/>
+        </p:nvPicPr>
+        <p:blipFill>
+          <a:blip r:embed="rId2"/>
+          <a:stretch>
+            <a:fillRect/>
+          </a:stretch>
+        </p:blipFill>
+        <p:spPr>
+          <a:xfrm>
+            <a:off x="6568439" y="1931614"/>
+            <a:ext cx="4561115" cy="3315152"/>
+          </a:xfrm>
+          <a:prstGeom prst="rect">
+            <a:avLst/>
+          </a:prstGeom>
+        </p:spPr>
+      </p:pic>
+      <p:sp>
+        <p:nvSpPr>
+          <p:cNvPr id="4" name="TextBox 3">
+            <a:extLst>
+              <a:ext uri="{FF2B5EF4-FFF2-40B4-BE49-F238E27FC236}">
+                <a16:creationId xmlns:a16="http://schemas.microsoft.com/office/drawing/2014/main" id="{3E360152-7041-5F7C-6194-215A2995C070}"/>
+              </a:ext>
+            </a:extLst>
+          </p:cNvPr>
+          <p:cNvSpPr txBox="1"/>
+          <p:nvPr/>
+        </p:nvSpPr>
+        <p:spPr>
+          <a:xfrm>
+            <a:off x="235670" y="1813560"/>
+            <a:ext cx="5623975" cy="2862322"/>
+          </a:xfrm>
+          <a:prstGeom prst="rect">
+            <a:avLst/>
+          </a:prstGeom>
+          <a:noFill/>
+        </p:spPr>
+        <p:txBody>
+          <a:bodyPr wrap="none" rtlCol="0">
+            <a:spAutoFit/>
+          </a:bodyPr>
+          <a:lstStyle/>
+          <a:p>
+            <a:r>
+              <a:rPr lang="en-GB" b="1" dirty="0"/>
+              <a:t>Performances </a:t>
+            </a:r>
+            <a:r>
+              <a:rPr lang="en-GB" b="1" dirty="0" err="1"/>
+              <a:t>mitigées</a:t>
+            </a:r>
+            <a:endParaRPr lang="en-GB" b="1" dirty="0"/>
+          </a:p>
+          <a:p>
+            <a:pPr marL="285750" indent="-285750">
+              <a:buFont typeface="Wingdings" panose="05000000000000000000" pitchFamily="2" charset="2"/>
+              <a:buChar char="à"/>
+            </a:pPr>
+            <a:r>
+              <a:rPr lang="en-GB" dirty="0">
+                <a:sym typeface="Wingdings" panose="05000000000000000000" pitchFamily="2" charset="2"/>
+              </a:rPr>
+              <a:t>Pas </a:t>
+            </a:r>
+            <a:r>
+              <a:rPr lang="en-GB" dirty="0" err="1">
+                <a:sym typeface="Wingdings" panose="05000000000000000000" pitchFamily="2" charset="2"/>
+              </a:rPr>
+              <a:t>d’amélioration</a:t>
+            </a:r>
+            <a:r>
+              <a:rPr lang="en-GB" dirty="0">
+                <a:sym typeface="Wingdings" panose="05000000000000000000" pitchFamily="2" charset="2"/>
+              </a:rPr>
+              <a:t> avec standardisation</a:t>
+            </a:r>
+          </a:p>
+          <a:p>
+            <a:pPr marL="742950" lvl="1" indent="-285750">
+              <a:buFont typeface="Wingdings" panose="05000000000000000000" pitchFamily="2" charset="2"/>
+              <a:buChar char="à"/>
+            </a:pPr>
+            <a:r>
+              <a:rPr lang="en-GB" dirty="0">
+                <a:sym typeface="Wingdings" panose="05000000000000000000" pitchFamily="2" charset="2"/>
+              </a:rPr>
+              <a:t>Contraire aux </a:t>
+            </a:r>
+            <a:r>
+              <a:rPr lang="en-GB" dirty="0" err="1">
+                <a:sym typeface="Wingdings" panose="05000000000000000000" pitchFamily="2" charset="2"/>
+              </a:rPr>
+              <a:t>attentes</a:t>
+            </a:r>
+            <a:endParaRPr lang="en-GB" dirty="0">
+              <a:sym typeface="Wingdings" panose="05000000000000000000" pitchFamily="2" charset="2"/>
+            </a:endParaRPr>
+          </a:p>
+          <a:p>
+            <a:pPr marL="742950" lvl="1" indent="-285750">
+              <a:buFont typeface="Wingdings" panose="05000000000000000000" pitchFamily="2" charset="2"/>
+              <a:buChar char="à"/>
+            </a:pPr>
+            <a:endParaRPr lang="en-GB" dirty="0"/>
+          </a:p>
+          <a:p>
+            <a:r>
+              <a:rPr lang="en-GB" b="1" dirty="0"/>
+              <a:t>Relation </a:t>
+            </a:r>
+            <a:r>
+              <a:rPr lang="en-GB" b="1" dirty="0" err="1"/>
+              <a:t>effectivement</a:t>
+            </a:r>
+            <a:r>
+              <a:rPr lang="en-GB" b="1" dirty="0"/>
+              <a:t> </a:t>
+            </a:r>
+            <a:r>
+              <a:rPr lang="en-GB" b="1" dirty="0" err="1"/>
+              <a:t>linéaire</a:t>
+            </a:r>
+            <a:endParaRPr lang="en-GB" b="1" dirty="0"/>
+          </a:p>
+          <a:p>
+            <a:pPr marL="285750" indent="-285750">
+              <a:buFont typeface="Wingdings" panose="05000000000000000000" pitchFamily="2" charset="2"/>
+              <a:buChar char="à"/>
+            </a:pPr>
+            <a:r>
+              <a:rPr lang="en-GB" dirty="0">
+                <a:sym typeface="Wingdings" panose="05000000000000000000" pitchFamily="2" charset="2"/>
+              </a:rPr>
+              <a:t>R² </a:t>
+            </a:r>
+            <a:r>
+              <a:rPr lang="en-GB" dirty="0" err="1">
+                <a:sym typeface="Wingdings" panose="05000000000000000000" pitchFamily="2" charset="2"/>
+              </a:rPr>
+              <a:t>élevé</a:t>
+            </a:r>
+            <a:endParaRPr lang="en-GB" dirty="0">
+              <a:sym typeface="Wingdings" panose="05000000000000000000" pitchFamily="2" charset="2"/>
+            </a:endParaRPr>
+          </a:p>
+          <a:p>
+            <a:pPr marL="285750" indent="-285750">
+              <a:buFont typeface="Wingdings" panose="05000000000000000000" pitchFamily="2" charset="2"/>
+              <a:buChar char="à"/>
+            </a:pPr>
+            <a:r>
+              <a:rPr lang="en-GB" dirty="0" err="1">
+                <a:sym typeface="Wingdings" panose="05000000000000000000" pitchFamily="2" charset="2"/>
+              </a:rPr>
+              <a:t>Erreur</a:t>
+            </a:r>
+            <a:r>
+              <a:rPr lang="en-GB" dirty="0">
+                <a:sym typeface="Wingdings" panose="05000000000000000000" pitchFamily="2" charset="2"/>
+              </a:rPr>
+              <a:t> </a:t>
+            </a:r>
+            <a:r>
+              <a:rPr lang="en-GB" dirty="0" err="1">
+                <a:sym typeface="Wingdings" panose="05000000000000000000" pitchFamily="2" charset="2"/>
+              </a:rPr>
+              <a:t>faible</a:t>
+            </a:r>
+            <a:r>
+              <a:rPr lang="en-GB" dirty="0">
+                <a:sym typeface="Wingdings" panose="05000000000000000000" pitchFamily="2" charset="2"/>
+              </a:rPr>
+              <a:t>, </a:t>
+            </a:r>
+            <a:r>
+              <a:rPr lang="en-GB" dirty="0" err="1">
+                <a:sym typeface="Wingdings" panose="05000000000000000000" pitchFamily="2" charset="2"/>
+              </a:rPr>
+              <a:t>autour</a:t>
+            </a:r>
+            <a:r>
+              <a:rPr lang="en-GB" dirty="0">
+                <a:sym typeface="Wingdings" panose="05000000000000000000" pitchFamily="2" charset="2"/>
+              </a:rPr>
+              <a:t> des 5%</a:t>
+            </a:r>
+          </a:p>
+          <a:p>
+            <a:pPr marL="285750" indent="-285750">
+              <a:buFont typeface="Wingdings" panose="05000000000000000000" pitchFamily="2" charset="2"/>
+              <a:buChar char="à"/>
+            </a:pPr>
+            <a:endParaRPr lang="en-GB" dirty="0">
+              <a:sym typeface="Wingdings" panose="05000000000000000000" pitchFamily="2" charset="2"/>
+            </a:endParaRPr>
+          </a:p>
+          <a:p>
+            <a:r>
+              <a:rPr lang="en-GB" b="1" dirty="0">
+                <a:sym typeface="Wingdings" panose="05000000000000000000" pitchFamily="2" charset="2"/>
+              </a:rPr>
+              <a:t>Pour </a:t>
+            </a:r>
+            <a:r>
+              <a:rPr lang="en-GB" b="1" dirty="0" err="1">
+                <a:sym typeface="Wingdings" panose="05000000000000000000" pitchFamily="2" charset="2"/>
+              </a:rPr>
+              <a:t>aller</a:t>
+            </a:r>
+            <a:r>
+              <a:rPr lang="en-GB" b="1" dirty="0">
+                <a:sym typeface="Wingdings" panose="05000000000000000000" pitchFamily="2" charset="2"/>
+              </a:rPr>
+              <a:t> plus loin</a:t>
+            </a:r>
+          </a:p>
+          <a:p>
+            <a:r>
+              <a:rPr lang="en-GB" dirty="0">
+                <a:sym typeface="Wingdings" panose="05000000000000000000" pitchFamily="2" charset="2"/>
+              </a:rPr>
+              <a:t> Feature Engineering car variables </a:t>
+            </a:r>
+            <a:r>
+              <a:rPr lang="en-GB" dirty="0" err="1">
+                <a:sym typeface="Wingdings" panose="05000000000000000000" pitchFamily="2" charset="2"/>
+              </a:rPr>
+              <a:t>explicatives</a:t>
+            </a:r>
+            <a:r>
+              <a:rPr lang="en-GB" dirty="0">
+                <a:sym typeface="Wingdings" panose="05000000000000000000" pitchFamily="2" charset="2"/>
+              </a:rPr>
+              <a:t> </a:t>
+            </a:r>
+            <a:r>
+              <a:rPr lang="en-GB" dirty="0" err="1">
+                <a:sym typeface="Wingdings" panose="05000000000000000000" pitchFamily="2" charset="2"/>
+              </a:rPr>
+              <a:t>corrélées</a:t>
+            </a:r>
+            <a:endParaRPr lang="en-GB" dirty="0"/>
+          </a:p>
+        </p:txBody>
+      </p:sp>
+      <p:sp>
+        <p:nvSpPr>
+          <p:cNvPr id="5" name="TextBox 4">
+            <a:extLst>
+              <a:ext uri="{FF2B5EF4-FFF2-40B4-BE49-F238E27FC236}">
+                <a16:creationId xmlns:a16="http://schemas.microsoft.com/office/drawing/2014/main" id="{D3234D59-5486-1DD0-E774-B3A263B0971F}"/>
+              </a:ext>
+            </a:extLst>
+          </p:cNvPr>
+          <p:cNvSpPr txBox="1"/>
+          <p:nvPr/>
+        </p:nvSpPr>
+        <p:spPr>
+          <a:xfrm>
+            <a:off x="11756566" y="6370320"/>
+            <a:ext cx="301686" cy="369332"/>
+          </a:xfrm>
+          <a:prstGeom prst="rect">
+            <a:avLst/>
+          </a:prstGeom>
+          <a:noFill/>
+        </p:spPr>
+        <p:txBody>
+          <a:bodyPr wrap="none" rtlCol="0">
+            <a:spAutoFit/>
+          </a:bodyPr>
+          <a:lstStyle/>
+          <a:p>
+            <a:r>
+              <a:rPr lang="en-GB">
+                <a:solidFill>
+                  <a:schemeClr val="bg1"/>
+                </a:solidFill>
+              </a:rPr>
+              <a:t>7</a:t>
+            </a:r>
+            <a:endParaRPr lang="en-GB" dirty="0">
+              <a:solidFill>
+                <a:schemeClr val="bg1"/>
+              </a:solidFill>
+            </a:endParaRPr>
+          </a:p>
+        </p:txBody>
+      </p:sp>
+    </p:spTree>
+    <p:extLst>
+      <p:ext uri="{BB962C8B-B14F-4D97-AF65-F5344CB8AC3E}">
+        <p14:creationId xmlns:p14="http://schemas.microsoft.com/office/powerpoint/2010/main" val="916293060"/>
       </p:ext>
     </p:extLst>
   </p:cSld>
@@ -3657,4 +7065,299 @@
     </a:ext>
   </a:extLst>
 </a:theme>
+</file>
+
+<file path=ppt/theme/theme2.xml><?xml version="1.0" encoding="utf-8"?>
+<a:theme xmlns:a="http://schemas.openxmlformats.org/drawingml/2006/main" name="Office Theme">
+  <a:themeElements>
+    <a:clrScheme name="Office">
+      <a:dk1>
+        <a:sysClr val="windowText" lastClr="000000"/>
+      </a:dk1>
+      <a:lt1>
+        <a:sysClr val="window" lastClr="FFFFFF"/>
+      </a:lt1>
+      <a:dk2>
+        <a:srgbClr val="44546A"/>
+      </a:dk2>
+      <a:lt2>
+        <a:srgbClr val="E7E6E6"/>
+      </a:lt2>
+      <a:accent1>
+        <a:srgbClr val="4472C4"/>
+      </a:accent1>
+      <a:accent2>
+        <a:srgbClr val="ED7D31"/>
+      </a:accent2>
+      <a:accent3>
+        <a:srgbClr val="A5A5A5"/>
+      </a:accent3>
+      <a:accent4>
+        <a:srgbClr val="FFC000"/>
+      </a:accent4>
+      <a:accent5>
+        <a:srgbClr val="5B9BD5"/>
+      </a:accent5>
+      <a:accent6>
+        <a:srgbClr val="70AD47"/>
+      </a:accent6>
+      <a:hlink>
+        <a:srgbClr val="0563C1"/>
+      </a:hlink>
+      <a:folHlink>
+        <a:srgbClr val="954F72"/>
+      </a:folHlink>
+    </a:clrScheme>
+    <a:fontScheme name="Office">
+      <a:majorFont>
+        <a:latin typeface="Calibri Light" panose="020F0302020204030204"/>
+        <a:ea typeface=""/>
+        <a:cs typeface=""/>
+        <a:font script="Jpan" typeface="游ゴシック Light"/>
+        <a:font script="Hang" typeface="맑은 고딕"/>
+        <a:font script="Hans" typeface="等线 Light"/>
+        <a:font script="Hant" typeface="新細明體"/>
+        <a:font script="Arab" typeface="Times New Roman"/>
+        <a:font script="Hebr" typeface="Times New Roman"/>
+        <a:font script="Thai" typeface="Angsana New"/>
+        <a:font script="Ethi" typeface="Nyala"/>
+        <a:font script="Beng" typeface="Vrinda"/>
+        <a:font script="Gujr" typeface="Shruti"/>
+        <a:font script="Khmr" typeface="MoolBoran"/>
+        <a:font script="Knda" typeface="Tunga"/>
+        <a:font script="Guru" typeface="Raavi"/>
+        <a:font script="Cans" typeface="Euphemia"/>
+        <a:font script="Cher" typeface="Plantagenet Cherokee"/>
+        <a:font script="Yiii" typeface="Microsoft Yi Baiti"/>
+        <a:font script="Tibt" typeface="Microsoft Himalaya"/>
+        <a:font script="Thaa" typeface="MV Boli"/>
+        <a:font script="Deva" typeface="Mangal"/>
+        <a:font script="Telu" typeface="Gautami"/>
+        <a:font script="Taml" typeface="Latha"/>
+        <a:font script="Syrc" typeface="Estrangelo Edessa"/>
+        <a:font script="Orya" typeface="Kalinga"/>
+        <a:font script="Mlym" typeface="Kartika"/>
+        <a:font script="Laoo" typeface="DokChampa"/>
+        <a:font script="Sinh" typeface="Iskoola Pota"/>
+        <a:font script="Mong" typeface="Mongolian Baiti"/>
+        <a:font script="Viet" typeface="Times New Roman"/>
+        <a:font script="Uigh" typeface="Microsoft Uighur"/>
+        <a:font script="Geor" typeface="Sylfaen"/>
+        <a:font script="Armn" typeface="Arial"/>
+        <a:font script="Bugi" typeface="Leelawadee UI"/>
+        <a:font script="Bopo" typeface="Microsoft JhengHei"/>
+        <a:font script="Java" typeface="Javanese Text"/>
+        <a:font script="Lisu" typeface="Segoe UI"/>
+        <a:font script="Mymr" typeface="Myanmar Text"/>
+        <a:font script="Nkoo" typeface="Ebrima"/>
+        <a:font script="Olck" typeface="Nirmala UI"/>
+        <a:font script="Osma" typeface="Ebrima"/>
+        <a:font script="Phag" typeface="Phagspa"/>
+        <a:font script="Syrn" typeface="Estrangelo Edessa"/>
+        <a:font script="Syrj" typeface="Estrangelo Edessa"/>
+        <a:font script="Syre" typeface="Estrangelo Edessa"/>
+        <a:font script="Sora" typeface="Nirmala UI"/>
+        <a:font script="Tale" typeface="Microsoft Tai Le"/>
+        <a:font script="Talu" typeface="Microsoft New Tai Lue"/>
+        <a:font script="Tfng" typeface="Ebrima"/>
+      </a:majorFont>
+      <a:minorFont>
+        <a:latin typeface="Calibri" panose="020F0502020204030204"/>
+        <a:ea typeface=""/>
+        <a:cs typeface=""/>
+        <a:font script="Jpan" typeface="游ゴシック"/>
+        <a:font script="Hang" typeface="맑은 고딕"/>
+        <a:font script="Hans" typeface="等线"/>
+        <a:font script="Hant" typeface="新細明體"/>
+        <a:font script="Arab" typeface="Arial"/>
+        <a:font script="Hebr" typeface="Arial"/>
+        <a:font script="Thai" typeface="Cordia New"/>
+        <a:font script="Ethi" typeface="Nyala"/>
+        <a:font script="Beng" typeface="Vrinda"/>
+        <a:font script="Gujr" typeface="Shruti"/>
+        <a:font script="Khmr" typeface="DaunPenh"/>
+        <a:font script="Knda" typeface="Tunga"/>
+        <a:font script="Guru" typeface="Raavi"/>
+        <a:font script="Cans" typeface="Euphemia"/>
+        <a:font script="Cher" typeface="Plantagenet Cherokee"/>
+        <a:font script="Yiii" typeface="Microsoft Yi Baiti"/>
+        <a:font script="Tibt" typeface="Microsoft Himalaya"/>
+        <a:font script="Thaa" typeface="MV Boli"/>
+        <a:font script="Deva" typeface="Mangal"/>
+        <a:font script="Telu" typeface="Gautami"/>
+        <a:font script="Taml" typeface="Latha"/>
+        <a:font script="Syrc" typeface="Estrangelo Edessa"/>
+        <a:font script="Orya" typeface="Kalinga"/>
+        <a:font script="Mlym" typeface="Kartika"/>
+        <a:font script="Laoo" typeface="DokChampa"/>
+        <a:font script="Sinh" typeface="Iskoola Pota"/>
+        <a:font script="Mong" typeface="Mongolian Baiti"/>
+        <a:font script="Viet" typeface="Arial"/>
+        <a:font script="Uigh" typeface="Microsoft Uighur"/>
+        <a:font script="Geor" typeface="Sylfaen"/>
+        <a:font script="Armn" typeface="Arial"/>
+        <a:font script="Bugi" typeface="Leelawadee UI"/>
+        <a:font script="Bopo" typeface="Microsoft JhengHei"/>
+        <a:font script="Java" typeface="Javanese Text"/>
+        <a:font script="Lisu" typeface="Segoe UI"/>
+        <a:font script="Mymr" typeface="Myanmar Text"/>
+        <a:font script="Nkoo" typeface="Ebrima"/>
+        <a:font script="Olck" typeface="Nirmala UI"/>
+        <a:font script="Osma" typeface="Ebrima"/>
+        <a:font script="Phag" typeface="Phagspa"/>
+        <a:font script="Syrn" typeface="Estrangelo Edessa"/>
+        <a:font script="Syrj" typeface="Estrangelo Edessa"/>
+        <a:font script="Syre" typeface="Estrangelo Edessa"/>
+        <a:font script="Sora" typeface="Nirmala UI"/>
+        <a:font script="Tale" typeface="Microsoft Tai Le"/>
+        <a:font script="Talu" typeface="Microsoft New Tai Lue"/>
+        <a:font script="Tfng" typeface="Ebrima"/>
+      </a:minorFont>
+    </a:fontScheme>
+    <a:fmtScheme name="Office">
+      <a:fillStyleLst>
+        <a:solidFill>
+          <a:schemeClr val="phClr"/>
+        </a:solidFill>
+        <a:gradFill rotWithShape="1">
+          <a:gsLst>
+            <a:gs pos="0">
+              <a:schemeClr val="phClr">
+                <a:lumMod val="110000"/>
+                <a:satMod val="105000"/>
+                <a:tint val="67000"/>
+              </a:schemeClr>
+            </a:gs>
+            <a:gs pos="50000">
+              <a:schemeClr val="phClr">
+                <a:lumMod val="105000"/>
+                <a:satMod val="103000"/>
+                <a:tint val="73000"/>
+              </a:schemeClr>
+            </a:gs>
+            <a:gs pos="100000">
+              <a:schemeClr val="phClr">
+                <a:lumMod val="105000"/>
+                <a:satMod val="109000"/>
+                <a:tint val="81000"/>
+              </a:schemeClr>
+            </a:gs>
+          </a:gsLst>
+          <a:lin ang="5400000" scaled="0"/>
+        </a:gradFill>
+        <a:gradFill rotWithShape="1">
+          <a:gsLst>
+            <a:gs pos="0">
+              <a:schemeClr val="phClr">
+                <a:satMod val="103000"/>
+                <a:lumMod val="102000"/>
+                <a:tint val="94000"/>
+              </a:schemeClr>
+            </a:gs>
+            <a:gs pos="50000">
+              <a:schemeClr val="phClr">
+                <a:satMod val="110000"/>
+                <a:lumMod val="100000"/>
+                <a:shade val="100000"/>
+              </a:schemeClr>
+            </a:gs>
+            <a:gs pos="100000">
+              <a:schemeClr val="phClr">
+                <a:lumMod val="99000"/>
+                <a:satMod val="120000"/>
+                <a:shade val="78000"/>
+              </a:schemeClr>
+            </a:gs>
+          </a:gsLst>
+          <a:lin ang="5400000" scaled="0"/>
+        </a:gradFill>
+      </a:fillStyleLst>
+      <a:lnStyleLst>
+        <a:ln w="6350" cap="flat" cmpd="sng" algn="ctr">
+          <a:solidFill>
+            <a:schemeClr val="phClr"/>
+          </a:solidFill>
+          <a:prstDash val="solid"/>
+          <a:miter lim="800000"/>
+        </a:ln>
+        <a:ln w="12700" cap="flat" cmpd="sng" algn="ctr">
+          <a:solidFill>
+            <a:schemeClr val="phClr"/>
+          </a:solidFill>
+          <a:prstDash val="solid"/>
+          <a:miter lim="800000"/>
+        </a:ln>
+        <a:ln w="19050" cap="flat" cmpd="sng" algn="ctr">
+          <a:solidFill>
+            <a:schemeClr val="phClr"/>
+          </a:solidFill>
+          <a:prstDash val="solid"/>
+          <a:miter lim="800000"/>
+        </a:ln>
+      </a:lnStyleLst>
+      <a:effectStyleLst>
+        <a:effectStyle>
+          <a:effectLst/>
+        </a:effectStyle>
+        <a:effectStyle>
+          <a:effectLst/>
+        </a:effectStyle>
+        <a:effectStyle>
+          <a:effectLst>
+            <a:outerShdw blurRad="57150" dist="19050" dir="5400000" algn="ctr" rotWithShape="0">
+              <a:srgbClr val="000000">
+                <a:alpha val="63000"/>
+              </a:srgbClr>
+            </a:outerShdw>
+          </a:effectLst>
+        </a:effectStyle>
+      </a:effectStyleLst>
+      <a:bgFillStyleLst>
+        <a:solidFill>
+          <a:schemeClr val="phClr"/>
+        </a:solidFill>
+        <a:solidFill>
+          <a:schemeClr val="phClr">
+            <a:tint val="95000"/>
+            <a:satMod val="170000"/>
+          </a:schemeClr>
+        </a:solidFill>
+        <a:gradFill rotWithShape="1">
+          <a:gsLst>
+            <a:gs pos="0">
+              <a:schemeClr val="phClr">
+                <a:tint val="93000"/>
+                <a:satMod val="150000"/>
+                <a:shade val="98000"/>
+                <a:lumMod val="102000"/>
+              </a:schemeClr>
+            </a:gs>
+            <a:gs pos="50000">
+              <a:schemeClr val="phClr">
+                <a:tint val="98000"/>
+                <a:satMod val="130000"/>
+                <a:shade val="90000"/>
+                <a:lumMod val="103000"/>
+              </a:schemeClr>
+            </a:gs>
+            <a:gs pos="100000">
+              <a:schemeClr val="phClr">
+                <a:shade val="63000"/>
+                <a:satMod val="120000"/>
+              </a:schemeClr>
+            </a:gs>
+          </a:gsLst>
+          <a:lin ang="5400000" scaled="0"/>
+        </a:gradFill>
+      </a:bgFillStyleLst>
+    </a:fmtScheme>
+  </a:themeElements>
+  <a:objectDefaults/>
+  <a:extraClrSchemeLst/>
+  <a:extLst>
+    <a:ext uri="{05A4C25C-085E-4340-85A3-A5531E510DB2}">
+      <thm15:themeFamily xmlns:thm15="http://schemas.microsoft.com/office/thememl/2012/main" name="Office Theme" id="{62F939B6-93AF-4DB8-9C6B-D6C7DFDC589F}" vid="{4A3C46E8-61CC-4603-A589-7422A47A8E4A}"/>
+    </a:ext>
+  </a:extLst>
+</a:theme>
 </file>
</xml_diff>